<commit_message>
worked on wrapping for navbar links
</commit_message>
<xml_diff>
--- a/ppt/Slide Deck.pptx
+++ b/ppt/Slide Deck.pptx
@@ -4,10 +4,16 @@
   <p:sldMasterIdLst>
     <p:sldMasterId id="2147483648" r:id="rId1"/>
   </p:sldMasterIdLst>
+  <p:notesMasterIdLst>
+    <p:notesMasterId r:id="rId8"/>
+  </p:notesMasterIdLst>
   <p:sldIdLst>
     <p:sldId id="256" r:id="rId2"/>
-    <p:sldId id="257" r:id="rId3"/>
-    <p:sldId id="258" r:id="rId4"/>
+    <p:sldId id="259" r:id="rId3"/>
+    <p:sldId id="260" r:id="rId4"/>
+    <p:sldId id="261" r:id="rId5"/>
+    <p:sldId id="257" r:id="rId6"/>
+    <p:sldId id="258" r:id="rId7"/>
   </p:sldIdLst>
   <p:sldSz cx="9144000" cy="6858000" type="screen4x3"/>
   <p:notesSz cx="6858000" cy="9144000"/>
@@ -109,6 +115,708 @@
 </p:presentation>
 </file>
 
+<file path=ppt/notesMasters/notesMaster1.xml><?xml version="1.0" encoding="utf-8"?>
+<p:notesMaster xmlns:a="http://schemas.openxmlformats.org/drawingml/2006/main" xmlns:r="http://schemas.openxmlformats.org/officeDocument/2006/relationships" xmlns:p="http://schemas.openxmlformats.org/presentationml/2006/main">
+  <p:cSld>
+    <p:bg>
+      <p:bgRef idx="1001">
+        <a:schemeClr val="bg1"/>
+      </p:bgRef>
+    </p:bg>
+    <p:spTree>
+      <p:nvGrpSpPr>
+        <p:cNvPr id="1" name=""/>
+        <p:cNvGrpSpPr/>
+        <p:nvPr/>
+      </p:nvGrpSpPr>
+      <p:grpSpPr>
+        <a:xfrm>
+          <a:off x="0" y="0"/>
+          <a:ext cx="0" cy="0"/>
+          <a:chOff x="0" y="0"/>
+          <a:chExt cx="0" cy="0"/>
+        </a:xfrm>
+      </p:grpSpPr>
+      <p:sp>
+        <p:nvSpPr>
+          <p:cNvPr id="2" name="Header Placeholder 1"/>
+          <p:cNvSpPr>
+            <a:spLocks noGrp="1"/>
+          </p:cNvSpPr>
+          <p:nvPr>
+            <p:ph type="hdr" sz="quarter"/>
+          </p:nvPr>
+        </p:nvSpPr>
+        <p:spPr>
+          <a:xfrm>
+            <a:off x="0" y="0"/>
+            <a:ext cx="2971800" cy="457200"/>
+          </a:xfrm>
+          <a:prstGeom prst="rect">
+            <a:avLst/>
+          </a:prstGeom>
+        </p:spPr>
+        <p:txBody>
+          <a:bodyPr vert="horz" lIns="91440" tIns="45720" rIns="91440" bIns="45720" rtlCol="0"/>
+          <a:lstStyle>
+            <a:lvl1pPr algn="l">
+              <a:defRPr sz="1200"/>
+            </a:lvl1pPr>
+          </a:lstStyle>
+          <a:p>
+            <a:endParaRPr lang="en-AU"/>
+          </a:p>
+        </p:txBody>
+      </p:sp>
+      <p:sp>
+        <p:nvSpPr>
+          <p:cNvPr id="3" name="Date Placeholder 2"/>
+          <p:cNvSpPr>
+            <a:spLocks noGrp="1"/>
+          </p:cNvSpPr>
+          <p:nvPr>
+            <p:ph type="dt" idx="1"/>
+          </p:nvPr>
+        </p:nvSpPr>
+        <p:spPr>
+          <a:xfrm>
+            <a:off x="3884613" y="0"/>
+            <a:ext cx="2971800" cy="457200"/>
+          </a:xfrm>
+          <a:prstGeom prst="rect">
+            <a:avLst/>
+          </a:prstGeom>
+        </p:spPr>
+        <p:txBody>
+          <a:bodyPr vert="horz" lIns="91440" tIns="45720" rIns="91440" bIns="45720" rtlCol="0"/>
+          <a:lstStyle>
+            <a:lvl1pPr algn="r">
+              <a:defRPr sz="1200"/>
+            </a:lvl1pPr>
+          </a:lstStyle>
+          <a:p>
+            <a:fld id="{3E860FF5-3020-4B9C-ABD5-65ABBC874B95}" type="datetimeFigureOut">
+              <a:rPr lang="en-AU" smtClean="0"/>
+              <a:t>7/11/2022</a:t>
+            </a:fld>
+            <a:endParaRPr lang="en-AU"/>
+          </a:p>
+        </p:txBody>
+      </p:sp>
+      <p:sp>
+        <p:nvSpPr>
+          <p:cNvPr id="4" name="Slide Image Placeholder 3"/>
+          <p:cNvSpPr>
+            <a:spLocks noGrp="1" noRot="1" noChangeAspect="1"/>
+          </p:cNvSpPr>
+          <p:nvPr>
+            <p:ph type="sldImg" idx="2"/>
+          </p:nvPr>
+        </p:nvSpPr>
+        <p:spPr>
+          <a:xfrm>
+            <a:off x="1143000" y="685800"/>
+            <a:ext cx="4572000" cy="3429000"/>
+          </a:xfrm>
+          <a:prstGeom prst="rect">
+            <a:avLst/>
+          </a:prstGeom>
+          <a:noFill/>
+          <a:ln w="12700">
+            <a:solidFill>
+              <a:prstClr val="black"/>
+            </a:solidFill>
+          </a:ln>
+        </p:spPr>
+        <p:txBody>
+          <a:bodyPr vert="horz" lIns="91440" tIns="45720" rIns="91440" bIns="45720" rtlCol="0" anchor="ctr"/>
+          <a:lstStyle/>
+          <a:p>
+            <a:endParaRPr lang="en-AU"/>
+          </a:p>
+        </p:txBody>
+      </p:sp>
+      <p:sp>
+        <p:nvSpPr>
+          <p:cNvPr id="5" name="Notes Placeholder 4"/>
+          <p:cNvSpPr>
+            <a:spLocks noGrp="1"/>
+          </p:cNvSpPr>
+          <p:nvPr>
+            <p:ph type="body" sz="quarter" idx="3"/>
+          </p:nvPr>
+        </p:nvSpPr>
+        <p:spPr>
+          <a:xfrm>
+            <a:off x="685800" y="4343400"/>
+            <a:ext cx="5486400" cy="4114800"/>
+          </a:xfrm>
+          <a:prstGeom prst="rect">
+            <a:avLst/>
+          </a:prstGeom>
+        </p:spPr>
+        <p:txBody>
+          <a:bodyPr vert="horz" lIns="91440" tIns="45720" rIns="91440" bIns="45720" rtlCol="0"/>
+          <a:lstStyle/>
+          <a:p>
+            <a:pPr lvl="0"/>
+            <a:r>
+              <a:rPr lang="en-US" smtClean="0"/>
+              <a:t>Click to edit Master text styles</a:t>
+            </a:r>
+          </a:p>
+          <a:p>
+            <a:pPr lvl="1"/>
+            <a:r>
+              <a:rPr lang="en-US" smtClean="0"/>
+              <a:t>Second level</a:t>
+            </a:r>
+          </a:p>
+          <a:p>
+            <a:pPr lvl="2"/>
+            <a:r>
+              <a:rPr lang="en-US" smtClean="0"/>
+              <a:t>Third level</a:t>
+            </a:r>
+          </a:p>
+          <a:p>
+            <a:pPr lvl="3"/>
+            <a:r>
+              <a:rPr lang="en-US" smtClean="0"/>
+              <a:t>Fourth level</a:t>
+            </a:r>
+          </a:p>
+          <a:p>
+            <a:pPr lvl="4"/>
+            <a:r>
+              <a:rPr lang="en-US" smtClean="0"/>
+              <a:t>Fifth level</a:t>
+            </a:r>
+            <a:endParaRPr lang="en-AU"/>
+          </a:p>
+        </p:txBody>
+      </p:sp>
+      <p:sp>
+        <p:nvSpPr>
+          <p:cNvPr id="6" name="Footer Placeholder 5"/>
+          <p:cNvSpPr>
+            <a:spLocks noGrp="1"/>
+          </p:cNvSpPr>
+          <p:nvPr>
+            <p:ph type="ftr" sz="quarter" idx="4"/>
+          </p:nvPr>
+        </p:nvSpPr>
+        <p:spPr>
+          <a:xfrm>
+            <a:off x="0" y="8685213"/>
+            <a:ext cx="2971800" cy="457200"/>
+          </a:xfrm>
+          <a:prstGeom prst="rect">
+            <a:avLst/>
+          </a:prstGeom>
+        </p:spPr>
+        <p:txBody>
+          <a:bodyPr vert="horz" lIns="91440" tIns="45720" rIns="91440" bIns="45720" rtlCol="0" anchor="b"/>
+          <a:lstStyle>
+            <a:lvl1pPr algn="l">
+              <a:defRPr sz="1200"/>
+            </a:lvl1pPr>
+          </a:lstStyle>
+          <a:p>
+            <a:endParaRPr lang="en-AU"/>
+          </a:p>
+        </p:txBody>
+      </p:sp>
+      <p:sp>
+        <p:nvSpPr>
+          <p:cNvPr id="7" name="Slide Number Placeholder 6"/>
+          <p:cNvSpPr>
+            <a:spLocks noGrp="1"/>
+          </p:cNvSpPr>
+          <p:nvPr>
+            <p:ph type="sldNum" sz="quarter" idx="5"/>
+          </p:nvPr>
+        </p:nvSpPr>
+        <p:spPr>
+          <a:xfrm>
+            <a:off x="3884613" y="8685213"/>
+            <a:ext cx="2971800" cy="457200"/>
+          </a:xfrm>
+          <a:prstGeom prst="rect">
+            <a:avLst/>
+          </a:prstGeom>
+        </p:spPr>
+        <p:txBody>
+          <a:bodyPr vert="horz" lIns="91440" tIns="45720" rIns="91440" bIns="45720" rtlCol="0" anchor="b"/>
+          <a:lstStyle>
+            <a:lvl1pPr algn="r">
+              <a:defRPr sz="1200"/>
+            </a:lvl1pPr>
+          </a:lstStyle>
+          <a:p>
+            <a:fld id="{0E9BC69D-F06D-4E79-91B0-86A0AD069DBD}" type="slidenum">
+              <a:rPr lang="en-AU" smtClean="0"/>
+              <a:t>‹#›</a:t>
+            </a:fld>
+            <a:endParaRPr lang="en-AU"/>
+          </a:p>
+        </p:txBody>
+      </p:sp>
+    </p:spTree>
+    <p:extLst>
+      <p:ext uri="{BB962C8B-B14F-4D97-AF65-F5344CB8AC3E}">
+        <p14:creationId xmlns:p14="http://schemas.microsoft.com/office/powerpoint/2010/main" val="1658447179"/>
+      </p:ext>
+    </p:extLst>
+  </p:cSld>
+  <p:clrMap bg1="lt1" tx1="dk1" bg2="lt2" tx2="dk2" accent1="accent1" accent2="accent2" accent3="accent3" accent4="accent4" accent5="accent5" accent6="accent6" hlink="hlink" folHlink="folHlink"/>
+  <p:notesStyle>
+    <a:lvl1pPr marL="0" algn="l" defTabSz="914400" rtl="0" eaLnBrk="1" latinLnBrk="0" hangingPunct="1">
+      <a:defRPr sz="1200" kern="1200">
+        <a:solidFill>
+          <a:schemeClr val="tx1"/>
+        </a:solidFill>
+        <a:latin typeface="+mn-lt"/>
+        <a:ea typeface="+mn-ea"/>
+        <a:cs typeface="+mn-cs"/>
+      </a:defRPr>
+    </a:lvl1pPr>
+    <a:lvl2pPr marL="457200" algn="l" defTabSz="914400" rtl="0" eaLnBrk="1" latinLnBrk="0" hangingPunct="1">
+      <a:defRPr sz="1200" kern="1200">
+        <a:solidFill>
+          <a:schemeClr val="tx1"/>
+        </a:solidFill>
+        <a:latin typeface="+mn-lt"/>
+        <a:ea typeface="+mn-ea"/>
+        <a:cs typeface="+mn-cs"/>
+      </a:defRPr>
+    </a:lvl2pPr>
+    <a:lvl3pPr marL="914400" algn="l" defTabSz="914400" rtl="0" eaLnBrk="1" latinLnBrk="0" hangingPunct="1">
+      <a:defRPr sz="1200" kern="1200">
+        <a:solidFill>
+          <a:schemeClr val="tx1"/>
+        </a:solidFill>
+        <a:latin typeface="+mn-lt"/>
+        <a:ea typeface="+mn-ea"/>
+        <a:cs typeface="+mn-cs"/>
+      </a:defRPr>
+    </a:lvl3pPr>
+    <a:lvl4pPr marL="1371600" algn="l" defTabSz="914400" rtl="0" eaLnBrk="1" latinLnBrk="0" hangingPunct="1">
+      <a:defRPr sz="1200" kern="1200">
+        <a:solidFill>
+          <a:schemeClr val="tx1"/>
+        </a:solidFill>
+        <a:latin typeface="+mn-lt"/>
+        <a:ea typeface="+mn-ea"/>
+        <a:cs typeface="+mn-cs"/>
+      </a:defRPr>
+    </a:lvl4pPr>
+    <a:lvl5pPr marL="1828800" algn="l" defTabSz="914400" rtl="0" eaLnBrk="1" latinLnBrk="0" hangingPunct="1">
+      <a:defRPr sz="1200" kern="1200">
+        <a:solidFill>
+          <a:schemeClr val="tx1"/>
+        </a:solidFill>
+        <a:latin typeface="+mn-lt"/>
+        <a:ea typeface="+mn-ea"/>
+        <a:cs typeface="+mn-cs"/>
+      </a:defRPr>
+    </a:lvl5pPr>
+    <a:lvl6pPr marL="2286000" algn="l" defTabSz="914400" rtl="0" eaLnBrk="1" latinLnBrk="0" hangingPunct="1">
+      <a:defRPr sz="1200" kern="1200">
+        <a:solidFill>
+          <a:schemeClr val="tx1"/>
+        </a:solidFill>
+        <a:latin typeface="+mn-lt"/>
+        <a:ea typeface="+mn-ea"/>
+        <a:cs typeface="+mn-cs"/>
+      </a:defRPr>
+    </a:lvl6pPr>
+    <a:lvl7pPr marL="2743200" algn="l" defTabSz="914400" rtl="0" eaLnBrk="1" latinLnBrk="0" hangingPunct="1">
+      <a:defRPr sz="1200" kern="1200">
+        <a:solidFill>
+          <a:schemeClr val="tx1"/>
+        </a:solidFill>
+        <a:latin typeface="+mn-lt"/>
+        <a:ea typeface="+mn-ea"/>
+        <a:cs typeface="+mn-cs"/>
+      </a:defRPr>
+    </a:lvl7pPr>
+    <a:lvl8pPr marL="3200400" algn="l" defTabSz="914400" rtl="0" eaLnBrk="1" latinLnBrk="0" hangingPunct="1">
+      <a:defRPr sz="1200" kern="1200">
+        <a:solidFill>
+          <a:schemeClr val="tx1"/>
+        </a:solidFill>
+        <a:latin typeface="+mn-lt"/>
+        <a:ea typeface="+mn-ea"/>
+        <a:cs typeface="+mn-cs"/>
+      </a:defRPr>
+    </a:lvl8pPr>
+    <a:lvl9pPr marL="3657600" algn="l" defTabSz="914400" rtl="0" eaLnBrk="1" latinLnBrk="0" hangingPunct="1">
+      <a:defRPr sz="1200" kern="1200">
+        <a:solidFill>
+          <a:schemeClr val="tx1"/>
+        </a:solidFill>
+        <a:latin typeface="+mn-lt"/>
+        <a:ea typeface="+mn-ea"/>
+        <a:cs typeface="+mn-cs"/>
+      </a:defRPr>
+    </a:lvl9pPr>
+  </p:notesStyle>
+</p:notesMaster>
+</file>
+
+<file path=ppt/notesSlides/notesSlide1.xml><?xml version="1.0" encoding="utf-8"?>
+<p:notes xmlns:a="http://schemas.openxmlformats.org/drawingml/2006/main" xmlns:r="http://schemas.openxmlformats.org/officeDocument/2006/relationships" xmlns:p="http://schemas.openxmlformats.org/presentationml/2006/main">
+  <p:cSld>
+    <p:spTree>
+      <p:nvGrpSpPr>
+        <p:cNvPr id="1" name=""/>
+        <p:cNvGrpSpPr/>
+        <p:nvPr/>
+      </p:nvGrpSpPr>
+      <p:grpSpPr>
+        <a:xfrm>
+          <a:off x="0" y="0"/>
+          <a:ext cx="0" cy="0"/>
+          <a:chOff x="0" y="0"/>
+          <a:chExt cx="0" cy="0"/>
+        </a:xfrm>
+      </p:grpSpPr>
+      <p:sp>
+        <p:nvSpPr>
+          <p:cNvPr id="2" name="Slide Image Placeholder 1"/>
+          <p:cNvSpPr>
+            <a:spLocks noGrp="1" noRot="1" noChangeAspect="1"/>
+          </p:cNvSpPr>
+          <p:nvPr>
+            <p:ph type="sldImg"/>
+          </p:nvPr>
+        </p:nvSpPr>
+        <p:spPr/>
+      </p:sp>
+      <p:sp>
+        <p:nvSpPr>
+          <p:cNvPr id="3" name="Notes Placeholder 2"/>
+          <p:cNvSpPr>
+            <a:spLocks noGrp="1"/>
+          </p:cNvSpPr>
+          <p:nvPr>
+            <p:ph type="body" idx="1"/>
+          </p:nvPr>
+        </p:nvSpPr>
+        <p:spPr/>
+        <p:txBody>
+          <a:bodyPr/>
+          <a:lstStyle/>
+          <a:p>
+            <a:r>
+              <a:rPr lang="en-AU" dirty="0" smtClean="0"/>
+              <a:t>Landing page</a:t>
+            </a:r>
+            <a:endParaRPr lang="en-AU" dirty="0"/>
+          </a:p>
+        </p:txBody>
+      </p:sp>
+      <p:sp>
+        <p:nvSpPr>
+          <p:cNvPr id="4" name="Slide Number Placeholder 3"/>
+          <p:cNvSpPr>
+            <a:spLocks noGrp="1"/>
+          </p:cNvSpPr>
+          <p:nvPr>
+            <p:ph type="sldNum" sz="quarter" idx="10"/>
+          </p:nvPr>
+        </p:nvSpPr>
+        <p:spPr/>
+        <p:txBody>
+          <a:bodyPr/>
+          <a:lstStyle/>
+          <a:p>
+            <a:fld id="{0E9BC69D-F06D-4E79-91B0-86A0AD069DBD}" type="slidenum">
+              <a:rPr lang="en-AU" smtClean="0"/>
+              <a:t>1</a:t>
+            </a:fld>
+            <a:endParaRPr lang="en-AU"/>
+          </a:p>
+        </p:txBody>
+      </p:sp>
+    </p:spTree>
+    <p:extLst>
+      <p:ext uri="{BB962C8B-B14F-4D97-AF65-F5344CB8AC3E}">
+        <p14:creationId xmlns:p14="http://schemas.microsoft.com/office/powerpoint/2010/main" val="1957948746"/>
+      </p:ext>
+    </p:extLst>
+  </p:cSld>
+  <p:clrMapOvr>
+    <a:masterClrMapping/>
+  </p:clrMapOvr>
+</p:notes>
+</file>
+
+<file path=ppt/notesSlides/notesSlide2.xml><?xml version="1.0" encoding="utf-8"?>
+<p:notes xmlns:a="http://schemas.openxmlformats.org/drawingml/2006/main" xmlns:r="http://schemas.openxmlformats.org/officeDocument/2006/relationships" xmlns:p="http://schemas.openxmlformats.org/presentationml/2006/main">
+  <p:cSld>
+    <p:spTree>
+      <p:nvGrpSpPr>
+        <p:cNvPr id="1" name=""/>
+        <p:cNvGrpSpPr/>
+        <p:nvPr/>
+      </p:nvGrpSpPr>
+      <p:grpSpPr>
+        <a:xfrm>
+          <a:off x="0" y="0"/>
+          <a:ext cx="0" cy="0"/>
+          <a:chOff x="0" y="0"/>
+          <a:chExt cx="0" cy="0"/>
+        </a:xfrm>
+      </p:grpSpPr>
+      <p:sp>
+        <p:nvSpPr>
+          <p:cNvPr id="2" name="Slide Image Placeholder 1"/>
+          <p:cNvSpPr>
+            <a:spLocks noGrp="1" noRot="1" noChangeAspect="1"/>
+          </p:cNvSpPr>
+          <p:nvPr>
+            <p:ph type="sldImg"/>
+          </p:nvPr>
+        </p:nvSpPr>
+        <p:spPr/>
+      </p:sp>
+      <p:sp>
+        <p:nvSpPr>
+          <p:cNvPr id="3" name="Notes Placeholder 2"/>
+          <p:cNvSpPr>
+            <a:spLocks noGrp="1"/>
+          </p:cNvSpPr>
+          <p:nvPr>
+            <p:ph type="body" idx="1"/>
+          </p:nvPr>
+        </p:nvSpPr>
+        <p:spPr/>
+        <p:txBody>
+          <a:bodyPr/>
+          <a:lstStyle/>
+          <a:p>
+            <a:r>
+              <a:rPr lang="en-AU" dirty="0" smtClean="0"/>
+              <a:t>Landing page</a:t>
+            </a:r>
+            <a:endParaRPr lang="en-AU" dirty="0"/>
+          </a:p>
+        </p:txBody>
+      </p:sp>
+      <p:sp>
+        <p:nvSpPr>
+          <p:cNvPr id="4" name="Slide Number Placeholder 3"/>
+          <p:cNvSpPr>
+            <a:spLocks noGrp="1"/>
+          </p:cNvSpPr>
+          <p:nvPr>
+            <p:ph type="sldNum" sz="quarter" idx="10"/>
+          </p:nvPr>
+        </p:nvSpPr>
+        <p:spPr/>
+        <p:txBody>
+          <a:bodyPr/>
+          <a:lstStyle/>
+          <a:p>
+            <a:fld id="{0E9BC69D-F06D-4E79-91B0-86A0AD069DBD}" type="slidenum">
+              <a:rPr lang="en-AU" smtClean="0"/>
+              <a:t>2</a:t>
+            </a:fld>
+            <a:endParaRPr lang="en-AU"/>
+          </a:p>
+        </p:txBody>
+      </p:sp>
+    </p:spTree>
+    <p:extLst>
+      <p:ext uri="{BB962C8B-B14F-4D97-AF65-F5344CB8AC3E}">
+        <p14:creationId xmlns:p14="http://schemas.microsoft.com/office/powerpoint/2010/main" val="1957948746"/>
+      </p:ext>
+    </p:extLst>
+  </p:cSld>
+  <p:clrMapOvr>
+    <a:masterClrMapping/>
+  </p:clrMapOvr>
+</p:notes>
+</file>
+
+<file path=ppt/notesSlides/notesSlide3.xml><?xml version="1.0" encoding="utf-8"?>
+<p:notes xmlns:a="http://schemas.openxmlformats.org/drawingml/2006/main" xmlns:r="http://schemas.openxmlformats.org/officeDocument/2006/relationships" xmlns:p="http://schemas.openxmlformats.org/presentationml/2006/main">
+  <p:cSld>
+    <p:spTree>
+      <p:nvGrpSpPr>
+        <p:cNvPr id="1" name=""/>
+        <p:cNvGrpSpPr/>
+        <p:nvPr/>
+      </p:nvGrpSpPr>
+      <p:grpSpPr>
+        <a:xfrm>
+          <a:off x="0" y="0"/>
+          <a:ext cx="0" cy="0"/>
+          <a:chOff x="0" y="0"/>
+          <a:chExt cx="0" cy="0"/>
+        </a:xfrm>
+      </p:grpSpPr>
+      <p:sp>
+        <p:nvSpPr>
+          <p:cNvPr id="2" name="Slide Image Placeholder 1"/>
+          <p:cNvSpPr>
+            <a:spLocks noGrp="1" noRot="1" noChangeAspect="1"/>
+          </p:cNvSpPr>
+          <p:nvPr>
+            <p:ph type="sldImg"/>
+          </p:nvPr>
+        </p:nvSpPr>
+        <p:spPr/>
+      </p:sp>
+      <p:sp>
+        <p:nvSpPr>
+          <p:cNvPr id="3" name="Notes Placeholder 2"/>
+          <p:cNvSpPr>
+            <a:spLocks noGrp="1"/>
+          </p:cNvSpPr>
+          <p:nvPr>
+            <p:ph type="body" idx="1"/>
+          </p:nvPr>
+        </p:nvSpPr>
+        <p:spPr/>
+        <p:txBody>
+          <a:bodyPr/>
+          <a:lstStyle/>
+          <a:p>
+            <a:r>
+              <a:rPr lang="en-AU" dirty="0" smtClean="0"/>
+              <a:t>Landing page</a:t>
+            </a:r>
+            <a:endParaRPr lang="en-AU" dirty="0"/>
+          </a:p>
+        </p:txBody>
+      </p:sp>
+      <p:sp>
+        <p:nvSpPr>
+          <p:cNvPr id="4" name="Slide Number Placeholder 3"/>
+          <p:cNvSpPr>
+            <a:spLocks noGrp="1"/>
+          </p:cNvSpPr>
+          <p:nvPr>
+            <p:ph type="sldNum" sz="quarter" idx="10"/>
+          </p:nvPr>
+        </p:nvSpPr>
+        <p:spPr/>
+        <p:txBody>
+          <a:bodyPr/>
+          <a:lstStyle/>
+          <a:p>
+            <a:fld id="{0E9BC69D-F06D-4E79-91B0-86A0AD069DBD}" type="slidenum">
+              <a:rPr lang="en-AU" smtClean="0"/>
+              <a:t>3</a:t>
+            </a:fld>
+            <a:endParaRPr lang="en-AU"/>
+          </a:p>
+        </p:txBody>
+      </p:sp>
+    </p:spTree>
+    <p:extLst>
+      <p:ext uri="{BB962C8B-B14F-4D97-AF65-F5344CB8AC3E}">
+        <p14:creationId xmlns:p14="http://schemas.microsoft.com/office/powerpoint/2010/main" val="1957948746"/>
+      </p:ext>
+    </p:extLst>
+  </p:cSld>
+  <p:clrMapOvr>
+    <a:masterClrMapping/>
+  </p:clrMapOvr>
+</p:notes>
+</file>
+
+<file path=ppt/notesSlides/notesSlide4.xml><?xml version="1.0" encoding="utf-8"?>
+<p:notes xmlns:a="http://schemas.openxmlformats.org/drawingml/2006/main" xmlns:r="http://schemas.openxmlformats.org/officeDocument/2006/relationships" xmlns:p="http://schemas.openxmlformats.org/presentationml/2006/main">
+  <p:cSld>
+    <p:spTree>
+      <p:nvGrpSpPr>
+        <p:cNvPr id="1" name=""/>
+        <p:cNvGrpSpPr/>
+        <p:nvPr/>
+      </p:nvGrpSpPr>
+      <p:grpSpPr>
+        <a:xfrm>
+          <a:off x="0" y="0"/>
+          <a:ext cx="0" cy="0"/>
+          <a:chOff x="0" y="0"/>
+          <a:chExt cx="0" cy="0"/>
+        </a:xfrm>
+      </p:grpSpPr>
+      <p:sp>
+        <p:nvSpPr>
+          <p:cNvPr id="2" name="Slide Image Placeholder 1"/>
+          <p:cNvSpPr>
+            <a:spLocks noGrp="1" noRot="1" noChangeAspect="1"/>
+          </p:cNvSpPr>
+          <p:nvPr>
+            <p:ph type="sldImg"/>
+          </p:nvPr>
+        </p:nvSpPr>
+        <p:spPr/>
+      </p:sp>
+      <p:sp>
+        <p:nvSpPr>
+          <p:cNvPr id="3" name="Notes Placeholder 2"/>
+          <p:cNvSpPr>
+            <a:spLocks noGrp="1"/>
+          </p:cNvSpPr>
+          <p:nvPr>
+            <p:ph type="body" idx="1"/>
+          </p:nvPr>
+        </p:nvSpPr>
+        <p:spPr/>
+        <p:txBody>
+          <a:bodyPr/>
+          <a:lstStyle/>
+          <a:p>
+            <a:r>
+              <a:rPr lang="en-AU" dirty="0" smtClean="0"/>
+              <a:t>Landing page</a:t>
+            </a:r>
+            <a:endParaRPr lang="en-AU" dirty="0"/>
+          </a:p>
+        </p:txBody>
+      </p:sp>
+      <p:sp>
+        <p:nvSpPr>
+          <p:cNvPr id="4" name="Slide Number Placeholder 3"/>
+          <p:cNvSpPr>
+            <a:spLocks noGrp="1"/>
+          </p:cNvSpPr>
+          <p:nvPr>
+            <p:ph type="sldNum" sz="quarter" idx="10"/>
+          </p:nvPr>
+        </p:nvSpPr>
+        <p:spPr/>
+        <p:txBody>
+          <a:bodyPr/>
+          <a:lstStyle/>
+          <a:p>
+            <a:fld id="{0E9BC69D-F06D-4E79-91B0-86A0AD069DBD}" type="slidenum">
+              <a:rPr lang="en-AU" smtClean="0"/>
+              <a:t>4</a:t>
+            </a:fld>
+            <a:endParaRPr lang="en-AU"/>
+          </a:p>
+        </p:txBody>
+      </p:sp>
+    </p:spTree>
+    <p:extLst>
+      <p:ext uri="{BB962C8B-B14F-4D97-AF65-F5344CB8AC3E}">
+        <p14:creationId xmlns:p14="http://schemas.microsoft.com/office/powerpoint/2010/main" val="1957948746"/>
+      </p:ext>
+    </p:extLst>
+  </p:cSld>
+  <p:clrMapOvr>
+    <a:masterClrMapping/>
+  </p:clrMapOvr>
+</p:notes>
+</file>
+
 <file path=ppt/slideLayouts/slideLayout1.xml><?xml version="1.0" encoding="utf-8"?>
 <p:sldLayout xmlns:a="http://schemas.openxmlformats.org/drawingml/2006/main" xmlns:r="http://schemas.openxmlformats.org/officeDocument/2006/relationships" xmlns:p="http://schemas.openxmlformats.org/presentationml/2006/main" type="title" preserve="1">
   <p:cSld name="Title Slide">
@@ -290,7 +998,7 @@
           <a:p>
             <a:fld id="{30C82057-5E07-49DC-A834-E014E79DC199}" type="datetimeFigureOut">
               <a:rPr lang="en-AU" smtClean="0"/>
-              <a:t>1/11/2022</a:t>
+              <a:t>7/11/2022</a:t>
             </a:fld>
             <a:endParaRPr lang="en-AU"/>
           </a:p>
@@ -460,7 +1168,7 @@
           <a:p>
             <a:fld id="{30C82057-5E07-49DC-A834-E014E79DC199}" type="datetimeFigureOut">
               <a:rPr lang="en-AU" smtClean="0"/>
-              <a:t>1/11/2022</a:t>
+              <a:t>7/11/2022</a:t>
             </a:fld>
             <a:endParaRPr lang="en-AU"/>
           </a:p>
@@ -640,7 +1348,7 @@
           <a:p>
             <a:fld id="{30C82057-5E07-49DC-A834-E014E79DC199}" type="datetimeFigureOut">
               <a:rPr lang="en-AU" smtClean="0"/>
-              <a:t>1/11/2022</a:t>
+              <a:t>7/11/2022</a:t>
             </a:fld>
             <a:endParaRPr lang="en-AU"/>
           </a:p>
@@ -810,7 +1518,7 @@
           <a:p>
             <a:fld id="{30C82057-5E07-49DC-A834-E014E79DC199}" type="datetimeFigureOut">
               <a:rPr lang="en-AU" smtClean="0"/>
-              <a:t>1/11/2022</a:t>
+              <a:t>7/11/2022</a:t>
             </a:fld>
             <a:endParaRPr lang="en-AU"/>
           </a:p>
@@ -1056,7 +1764,7 @@
           <a:p>
             <a:fld id="{30C82057-5E07-49DC-A834-E014E79DC199}" type="datetimeFigureOut">
               <a:rPr lang="en-AU" smtClean="0"/>
-              <a:t>1/11/2022</a:t>
+              <a:t>7/11/2022</a:t>
             </a:fld>
             <a:endParaRPr lang="en-AU"/>
           </a:p>
@@ -1344,7 +2052,7 @@
           <a:p>
             <a:fld id="{30C82057-5E07-49DC-A834-E014E79DC199}" type="datetimeFigureOut">
               <a:rPr lang="en-AU" smtClean="0"/>
-              <a:t>1/11/2022</a:t>
+              <a:t>7/11/2022</a:t>
             </a:fld>
             <a:endParaRPr lang="en-AU"/>
           </a:p>
@@ -1766,7 +2474,7 @@
           <a:p>
             <a:fld id="{30C82057-5E07-49DC-A834-E014E79DC199}" type="datetimeFigureOut">
               <a:rPr lang="en-AU" smtClean="0"/>
-              <a:t>1/11/2022</a:t>
+              <a:t>7/11/2022</a:t>
             </a:fld>
             <a:endParaRPr lang="en-AU"/>
           </a:p>
@@ -1884,7 +2592,7 @@
           <a:p>
             <a:fld id="{30C82057-5E07-49DC-A834-E014E79DC199}" type="datetimeFigureOut">
               <a:rPr lang="en-AU" smtClean="0"/>
-              <a:t>1/11/2022</a:t>
+              <a:t>7/11/2022</a:t>
             </a:fld>
             <a:endParaRPr lang="en-AU"/>
           </a:p>
@@ -1979,7 +2687,7 @@
           <a:p>
             <a:fld id="{30C82057-5E07-49DC-A834-E014E79DC199}" type="datetimeFigureOut">
               <a:rPr lang="en-AU" smtClean="0"/>
-              <a:t>1/11/2022</a:t>
+              <a:t>7/11/2022</a:t>
             </a:fld>
             <a:endParaRPr lang="en-AU"/>
           </a:p>
@@ -2256,7 +2964,7 @@
           <a:p>
             <a:fld id="{30C82057-5E07-49DC-A834-E014E79DC199}" type="datetimeFigureOut">
               <a:rPr lang="en-AU" smtClean="0"/>
-              <a:t>1/11/2022</a:t>
+              <a:t>7/11/2022</a:t>
             </a:fld>
             <a:endParaRPr lang="en-AU"/>
           </a:p>
@@ -2509,7 +3217,7 @@
           <a:p>
             <a:fld id="{30C82057-5E07-49DC-A834-E014E79DC199}" type="datetimeFigureOut">
               <a:rPr lang="en-AU" smtClean="0"/>
-              <a:t>1/11/2022</a:t>
+              <a:t>7/11/2022</a:t>
             </a:fld>
             <a:endParaRPr lang="en-AU"/>
           </a:p>
@@ -2722,7 +3430,7 @@
           <a:p>
             <a:fld id="{30C82057-5E07-49DC-A834-E014E79DC199}" type="datetimeFigureOut">
               <a:rPr lang="en-AU" smtClean="0"/>
-              <a:t>1/11/2022</a:t>
+              <a:t>7/11/2022</a:t>
             </a:fld>
             <a:endParaRPr lang="en-AU"/>
           </a:p>
@@ -3107,14 +3815,19 @@
             <p:ph type="ctrTitle"/>
           </p:nvPr>
         </p:nvSpPr>
-        <p:spPr/>
+        <p:spPr>
+          <a:xfrm>
+            <a:off x="611560" y="260648"/>
+            <a:ext cx="7772400" cy="1470025"/>
+          </a:xfrm>
+        </p:spPr>
         <p:txBody>
           <a:bodyPr/>
           <a:lstStyle/>
           <a:p>
             <a:r>
               <a:rPr lang="en-AU" dirty="0" smtClean="0"/>
-              <a:t>Portfolio walk through</a:t>
+              <a:t>Portfolio walk through, Landing</a:t>
             </a:r>
             <a:endParaRPr lang="en-AU" dirty="0"/>
           </a:p>
@@ -3135,10 +3848,40 @@
           <a:bodyPr/>
           <a:lstStyle/>
           <a:p>
-            <a:endParaRPr lang="en-AU"/>
-          </a:p>
-        </p:txBody>
-      </p:sp>
+            <a:endParaRPr lang="en-AU" dirty="0"/>
+          </a:p>
+        </p:txBody>
+      </p:sp>
+      <p:pic>
+        <p:nvPicPr>
+          <p:cNvPr id="5" name="Picture 4" descr="Screen Clipping"/>
+          <p:cNvPicPr>
+            <a:picLocks noChangeAspect="1"/>
+          </p:cNvPicPr>
+          <p:nvPr/>
+        </p:nvPicPr>
+        <p:blipFill>
+          <a:blip r:embed="rId3">
+            <a:extLst>
+              <a:ext uri="{28A0092B-C50C-407E-A947-70E740481C1C}">
+                <a14:useLocalDpi xmlns:a14="http://schemas.microsoft.com/office/drawing/2010/main" val="0"/>
+              </a:ext>
+            </a:extLst>
+          </a:blip>
+          <a:stretch>
+            <a:fillRect/>
+          </a:stretch>
+        </p:blipFill>
+        <p:spPr>
+          <a:xfrm>
+            <a:off x="827584" y="1335315"/>
+            <a:ext cx="7387941" cy="4829990"/>
+          </a:xfrm>
+          <a:prstGeom prst="rect">
+            <a:avLst/>
+          </a:prstGeom>
+        </p:spPr>
+      </p:pic>
     </p:spTree>
     <p:extLst>
       <p:ext uri="{BB962C8B-B14F-4D97-AF65-F5344CB8AC3E}">
@@ -3179,14 +3922,19 @@
             <p:ph type="ctrTitle"/>
           </p:nvPr>
         </p:nvSpPr>
-        <p:spPr/>
+        <p:spPr>
+          <a:xfrm>
+            <a:off x="611560" y="260648"/>
+            <a:ext cx="7772400" cy="1470025"/>
+          </a:xfrm>
+        </p:spPr>
         <p:txBody>
           <a:bodyPr/>
           <a:lstStyle/>
           <a:p>
             <a:r>
               <a:rPr lang="en-AU" dirty="0" smtClean="0"/>
-              <a:t>Design process and decision making</a:t>
+              <a:t>About Me</a:t>
             </a:r>
             <a:endParaRPr lang="en-AU" dirty="0"/>
           </a:p>
@@ -3207,14 +3955,44 @@
           <a:bodyPr/>
           <a:lstStyle/>
           <a:p>
-            <a:endParaRPr lang="en-AU"/>
-          </a:p>
-        </p:txBody>
-      </p:sp>
+            <a:endParaRPr lang="en-AU" dirty="0"/>
+          </a:p>
+        </p:txBody>
+      </p:sp>
+      <p:pic>
+        <p:nvPicPr>
+          <p:cNvPr id="7" name="Picture 6" descr="Screen Clipping"/>
+          <p:cNvPicPr>
+            <a:picLocks noChangeAspect="1"/>
+          </p:cNvPicPr>
+          <p:nvPr/>
+        </p:nvPicPr>
+        <p:blipFill>
+          <a:blip r:embed="rId3">
+            <a:extLst>
+              <a:ext uri="{28A0092B-C50C-407E-A947-70E740481C1C}">
+                <a14:useLocalDpi xmlns:a14="http://schemas.microsoft.com/office/drawing/2010/main" val="0"/>
+              </a:ext>
+            </a:extLst>
+          </a:blip>
+          <a:stretch>
+            <a:fillRect/>
+          </a:stretch>
+        </p:blipFill>
+        <p:spPr>
+          <a:xfrm>
+            <a:off x="827584" y="1412775"/>
+            <a:ext cx="7668344" cy="5344603"/>
+          </a:xfrm>
+          <a:prstGeom prst="rect">
+            <a:avLst/>
+          </a:prstGeom>
+        </p:spPr>
+      </p:pic>
     </p:spTree>
     <p:extLst>
       <p:ext uri="{BB962C8B-B14F-4D97-AF65-F5344CB8AC3E}">
-        <p14:creationId xmlns:p14="http://schemas.microsoft.com/office/powerpoint/2010/main" val="2657964874"/>
+        <p14:creationId xmlns:p14="http://schemas.microsoft.com/office/powerpoint/2010/main" val="3907354526"/>
       </p:ext>
     </p:extLst>
   </p:cSld>
@@ -3251,6 +4029,302 @@
             <p:ph type="ctrTitle"/>
           </p:nvPr>
         </p:nvSpPr>
+        <p:spPr>
+          <a:xfrm>
+            <a:off x="611560" y="260648"/>
+            <a:ext cx="7772400" cy="1470025"/>
+          </a:xfrm>
+        </p:spPr>
+        <p:txBody>
+          <a:bodyPr/>
+          <a:lstStyle/>
+          <a:p>
+            <a:r>
+              <a:rPr lang="en-AU" dirty="0" smtClean="0"/>
+              <a:t>Projects</a:t>
+            </a:r>
+            <a:endParaRPr lang="en-AU" dirty="0"/>
+          </a:p>
+        </p:txBody>
+      </p:sp>
+      <p:sp>
+        <p:nvSpPr>
+          <p:cNvPr id="3" name="Subtitle 2"/>
+          <p:cNvSpPr>
+            <a:spLocks noGrp="1"/>
+          </p:cNvSpPr>
+          <p:nvPr>
+            <p:ph type="subTitle" idx="1"/>
+          </p:nvPr>
+        </p:nvSpPr>
+        <p:spPr/>
+        <p:txBody>
+          <a:bodyPr/>
+          <a:lstStyle/>
+          <a:p>
+            <a:endParaRPr lang="en-AU" dirty="0"/>
+          </a:p>
+        </p:txBody>
+      </p:sp>
+      <p:pic>
+        <p:nvPicPr>
+          <p:cNvPr id="4" name="Picture 3" descr="Screen Clipping"/>
+          <p:cNvPicPr>
+            <a:picLocks noChangeAspect="1"/>
+          </p:cNvPicPr>
+          <p:nvPr/>
+        </p:nvPicPr>
+        <p:blipFill>
+          <a:blip r:embed="rId3">
+            <a:extLst>
+              <a:ext uri="{28A0092B-C50C-407E-A947-70E740481C1C}">
+                <a14:useLocalDpi xmlns:a14="http://schemas.microsoft.com/office/drawing/2010/main" val="0"/>
+              </a:ext>
+            </a:extLst>
+          </a:blip>
+          <a:stretch>
+            <a:fillRect/>
+          </a:stretch>
+        </p:blipFill>
+        <p:spPr>
+          <a:xfrm>
+            <a:off x="1547664" y="1268758"/>
+            <a:ext cx="6264741" cy="5471417"/>
+          </a:xfrm>
+          <a:prstGeom prst="rect">
+            <a:avLst/>
+          </a:prstGeom>
+        </p:spPr>
+      </p:pic>
+    </p:spTree>
+    <p:extLst>
+      <p:ext uri="{BB962C8B-B14F-4D97-AF65-F5344CB8AC3E}">
+        <p14:creationId xmlns:p14="http://schemas.microsoft.com/office/powerpoint/2010/main" val="3853075534"/>
+      </p:ext>
+    </p:extLst>
+  </p:cSld>
+  <p:clrMapOvr>
+    <a:masterClrMapping/>
+  </p:clrMapOvr>
+</p:sld>
+</file>
+
+<file path=ppt/slides/slide4.xml><?xml version="1.0" encoding="utf-8"?>
+<p:sld xmlns:a="http://schemas.openxmlformats.org/drawingml/2006/main" xmlns:r="http://schemas.openxmlformats.org/officeDocument/2006/relationships" xmlns:p="http://schemas.openxmlformats.org/presentationml/2006/main">
+  <p:cSld>
+    <p:spTree>
+      <p:nvGrpSpPr>
+        <p:cNvPr id="1" name=""/>
+        <p:cNvGrpSpPr/>
+        <p:nvPr/>
+      </p:nvGrpSpPr>
+      <p:grpSpPr>
+        <a:xfrm>
+          <a:off x="0" y="0"/>
+          <a:ext cx="0" cy="0"/>
+          <a:chOff x="0" y="0"/>
+          <a:chExt cx="0" cy="0"/>
+        </a:xfrm>
+      </p:grpSpPr>
+      <p:sp>
+        <p:nvSpPr>
+          <p:cNvPr id="2" name="Title 1"/>
+          <p:cNvSpPr>
+            <a:spLocks noGrp="1"/>
+          </p:cNvSpPr>
+          <p:nvPr>
+            <p:ph type="ctrTitle"/>
+          </p:nvPr>
+        </p:nvSpPr>
+        <p:spPr>
+          <a:xfrm>
+            <a:off x="611560" y="260648"/>
+            <a:ext cx="7772400" cy="1470025"/>
+          </a:xfrm>
+        </p:spPr>
+        <p:txBody>
+          <a:bodyPr/>
+          <a:lstStyle/>
+          <a:p>
+            <a:r>
+              <a:rPr lang="en-AU" dirty="0" smtClean="0"/>
+              <a:t>Blog</a:t>
+            </a:r>
+            <a:endParaRPr lang="en-AU" dirty="0"/>
+          </a:p>
+        </p:txBody>
+      </p:sp>
+      <p:sp>
+        <p:nvSpPr>
+          <p:cNvPr id="3" name="Subtitle 2"/>
+          <p:cNvSpPr>
+            <a:spLocks noGrp="1"/>
+          </p:cNvSpPr>
+          <p:nvPr>
+            <p:ph type="subTitle" idx="1"/>
+          </p:nvPr>
+        </p:nvSpPr>
+        <p:spPr/>
+        <p:txBody>
+          <a:bodyPr/>
+          <a:lstStyle/>
+          <a:p>
+            <a:endParaRPr lang="en-AU" dirty="0"/>
+          </a:p>
+        </p:txBody>
+      </p:sp>
+      <p:pic>
+        <p:nvPicPr>
+          <p:cNvPr id="4" name="Picture 3" descr="Screen Clipping"/>
+          <p:cNvPicPr>
+            <a:picLocks noChangeAspect="1"/>
+          </p:cNvPicPr>
+          <p:nvPr/>
+        </p:nvPicPr>
+        <p:blipFill>
+          <a:blip r:embed="rId3">
+            <a:extLst>
+              <a:ext uri="{28A0092B-C50C-407E-A947-70E740481C1C}">
+                <a14:useLocalDpi xmlns:a14="http://schemas.microsoft.com/office/drawing/2010/main" val="0"/>
+              </a:ext>
+            </a:extLst>
+          </a:blip>
+          <a:stretch>
+            <a:fillRect/>
+          </a:stretch>
+        </p:blipFill>
+        <p:spPr>
+          <a:xfrm>
+            <a:off x="1403648" y="1340768"/>
+            <a:ext cx="6073975" cy="5445224"/>
+          </a:xfrm>
+          <a:prstGeom prst="rect">
+            <a:avLst/>
+          </a:prstGeom>
+        </p:spPr>
+      </p:pic>
+    </p:spTree>
+    <p:extLst>
+      <p:ext uri="{BB962C8B-B14F-4D97-AF65-F5344CB8AC3E}">
+        <p14:creationId xmlns:p14="http://schemas.microsoft.com/office/powerpoint/2010/main" val="3853075534"/>
+      </p:ext>
+    </p:extLst>
+  </p:cSld>
+  <p:clrMapOvr>
+    <a:masterClrMapping/>
+  </p:clrMapOvr>
+</p:sld>
+</file>
+
+<file path=ppt/slides/slide5.xml><?xml version="1.0" encoding="utf-8"?>
+<p:sld xmlns:a="http://schemas.openxmlformats.org/drawingml/2006/main" xmlns:r="http://schemas.openxmlformats.org/officeDocument/2006/relationships" xmlns:p="http://schemas.openxmlformats.org/presentationml/2006/main">
+  <p:cSld>
+    <p:spTree>
+      <p:nvGrpSpPr>
+        <p:cNvPr id="1" name=""/>
+        <p:cNvGrpSpPr/>
+        <p:nvPr/>
+      </p:nvGrpSpPr>
+      <p:grpSpPr>
+        <a:xfrm>
+          <a:off x="0" y="0"/>
+          <a:ext cx="0" cy="0"/>
+          <a:chOff x="0" y="0"/>
+          <a:chExt cx="0" cy="0"/>
+        </a:xfrm>
+      </p:grpSpPr>
+      <p:sp>
+        <p:nvSpPr>
+          <p:cNvPr id="2" name="Title 1"/>
+          <p:cNvSpPr>
+            <a:spLocks noGrp="1"/>
+          </p:cNvSpPr>
+          <p:nvPr>
+            <p:ph type="ctrTitle"/>
+          </p:nvPr>
+        </p:nvSpPr>
+        <p:spPr/>
+        <p:txBody>
+          <a:bodyPr/>
+          <a:lstStyle/>
+          <a:p>
+            <a:r>
+              <a:rPr lang="en-AU" dirty="0" smtClean="0"/>
+              <a:t>Design process and decision making</a:t>
+            </a:r>
+            <a:endParaRPr lang="en-AU" dirty="0"/>
+          </a:p>
+        </p:txBody>
+      </p:sp>
+      <p:sp>
+        <p:nvSpPr>
+          <p:cNvPr id="3" name="Subtitle 2"/>
+          <p:cNvSpPr>
+            <a:spLocks noGrp="1"/>
+          </p:cNvSpPr>
+          <p:nvPr>
+            <p:ph type="subTitle" idx="1"/>
+          </p:nvPr>
+        </p:nvSpPr>
+        <p:spPr/>
+        <p:txBody>
+          <a:bodyPr/>
+          <a:lstStyle/>
+          <a:p>
+            <a:r>
+              <a:rPr lang="en-AU" dirty="0" smtClean="0"/>
+              <a:t>Looked at multiple web designs and got inspiration for coding. </a:t>
+            </a:r>
+          </a:p>
+          <a:p>
+            <a:r>
+              <a:rPr lang="en-AU" dirty="0" smtClean="0"/>
+              <a:t>I tried to get the best of all of them</a:t>
+            </a:r>
+            <a:endParaRPr lang="en-AU" dirty="0"/>
+          </a:p>
+        </p:txBody>
+      </p:sp>
+    </p:spTree>
+    <p:extLst>
+      <p:ext uri="{BB962C8B-B14F-4D97-AF65-F5344CB8AC3E}">
+        <p14:creationId xmlns:p14="http://schemas.microsoft.com/office/powerpoint/2010/main" val="2657964874"/>
+      </p:ext>
+    </p:extLst>
+  </p:cSld>
+  <p:clrMapOvr>
+    <a:masterClrMapping/>
+  </p:clrMapOvr>
+</p:sld>
+</file>
+
+<file path=ppt/slides/slide6.xml><?xml version="1.0" encoding="utf-8"?>
+<p:sld xmlns:a="http://schemas.openxmlformats.org/drawingml/2006/main" xmlns:r="http://schemas.openxmlformats.org/officeDocument/2006/relationships" xmlns:p="http://schemas.openxmlformats.org/presentationml/2006/main">
+  <p:cSld>
+    <p:spTree>
+      <p:nvGrpSpPr>
+        <p:cNvPr id="1" name=""/>
+        <p:cNvGrpSpPr/>
+        <p:nvPr/>
+      </p:nvGrpSpPr>
+      <p:grpSpPr>
+        <a:xfrm>
+          <a:off x="0" y="0"/>
+          <a:ext cx="0" cy="0"/>
+          <a:chOff x="0" y="0"/>
+          <a:chExt cx="0" cy="0"/>
+        </a:xfrm>
+      </p:grpSpPr>
+      <p:sp>
+        <p:nvSpPr>
+          <p:cNvPr id="2" name="Title 1"/>
+          <p:cNvSpPr>
+            <a:spLocks noGrp="1"/>
+          </p:cNvSpPr>
+          <p:nvPr>
+            <p:ph type="ctrTitle"/>
+          </p:nvPr>
+        </p:nvSpPr>
         <p:spPr/>
         <p:txBody>
           <a:bodyPr/>
@@ -3276,7 +4350,9 @@
         </p:nvSpPr>
         <p:spPr/>
         <p:txBody>
-          <a:bodyPr/>
+          <a:bodyPr>
+            <a:normAutofit fontScale="70000" lnSpcReduction="20000"/>
+          </a:bodyPr>
           <a:lstStyle/>
           <a:p>
             <a:pPr marL="457200" indent="-457200" algn="l">
@@ -3285,8 +4361,9 @@
             </a:pPr>
             <a:r>
               <a:rPr lang="en-AU" dirty="0" smtClean="0"/>
-              <a:t>Challenges</a:t>
-            </a:r>
+              <a:t>Challenges: making the flex box work for the small devices. </a:t>
+            </a:r>
+            <a:endParaRPr lang="en-AU" dirty="0" smtClean="0"/>
           </a:p>
           <a:p>
             <a:pPr marL="457200" indent="-457200" algn="l">
@@ -3295,8 +4372,13 @@
             </a:pPr>
             <a:r>
               <a:rPr lang="en-AU" dirty="0" smtClean="0"/>
-              <a:t>Ethical issues</a:t>
-            </a:r>
+              <a:t>Ethical </a:t>
+            </a:r>
+            <a:r>
+              <a:rPr lang="en-AU" dirty="0" smtClean="0"/>
+              <a:t>issues: not as I am aware off.</a:t>
+            </a:r>
+            <a:endParaRPr lang="en-AU" dirty="0" smtClean="0"/>
           </a:p>
           <a:p>
             <a:pPr marL="457200" indent="-457200" algn="l">
@@ -3305,7 +4387,11 @@
             </a:pPr>
             <a:r>
               <a:rPr lang="en-AU" dirty="0" smtClean="0"/>
-              <a:t>Favourite parts</a:t>
+              <a:t>Favourite </a:t>
+            </a:r>
+            <a:r>
+              <a:rPr lang="en-AU" dirty="0" smtClean="0"/>
+              <a:t>parts: designing the graphic elements</a:t>
             </a:r>
             <a:endParaRPr lang="en-AU" dirty="0"/>
           </a:p>
@@ -3607,4 +4693,289 @@
   <a:objectDefaults/>
   <a:extraClrSchemeLst/>
 </a:theme>
+</file>
+
+<file path=ppt/theme/theme2.xml><?xml version="1.0" encoding="utf-8"?>
+<a:theme xmlns:a="http://schemas.openxmlformats.org/drawingml/2006/main" name="Office Theme">
+  <a:themeElements>
+    <a:clrScheme name="Office">
+      <a:dk1>
+        <a:sysClr val="windowText" lastClr="000000"/>
+      </a:dk1>
+      <a:lt1>
+        <a:sysClr val="window" lastClr="FFFFFF"/>
+      </a:lt1>
+      <a:dk2>
+        <a:srgbClr val="1F497D"/>
+      </a:dk2>
+      <a:lt2>
+        <a:srgbClr val="EEECE1"/>
+      </a:lt2>
+      <a:accent1>
+        <a:srgbClr val="4F81BD"/>
+      </a:accent1>
+      <a:accent2>
+        <a:srgbClr val="C0504D"/>
+      </a:accent2>
+      <a:accent3>
+        <a:srgbClr val="9BBB59"/>
+      </a:accent3>
+      <a:accent4>
+        <a:srgbClr val="8064A2"/>
+      </a:accent4>
+      <a:accent5>
+        <a:srgbClr val="4BACC6"/>
+      </a:accent5>
+      <a:accent6>
+        <a:srgbClr val="F79646"/>
+      </a:accent6>
+      <a:hlink>
+        <a:srgbClr val="0000FF"/>
+      </a:hlink>
+      <a:folHlink>
+        <a:srgbClr val="800080"/>
+      </a:folHlink>
+    </a:clrScheme>
+    <a:fontScheme name="Office">
+      <a:majorFont>
+        <a:latin typeface="Calibri"/>
+        <a:ea typeface=""/>
+        <a:cs typeface=""/>
+        <a:font script="Jpan" typeface="ＭＳ Ｐゴシック"/>
+        <a:font script="Hang" typeface="맑은 고딕"/>
+        <a:font script="Hans" typeface="宋体"/>
+        <a:font script="Hant" typeface="新細明體"/>
+        <a:font script="Arab" typeface="Times New Roman"/>
+        <a:font script="Hebr" typeface="Times New Roman"/>
+        <a:font script="Thai" typeface="Angsana New"/>
+        <a:font script="Ethi" typeface="Nyala"/>
+        <a:font script="Beng" typeface="Vrinda"/>
+        <a:font script="Gujr" typeface="Shruti"/>
+        <a:font script="Khmr" typeface="MoolBoran"/>
+        <a:font script="Knda" typeface="Tunga"/>
+        <a:font script="Guru" typeface="Raavi"/>
+        <a:font script="Cans" typeface="Euphemia"/>
+        <a:font script="Cher" typeface="Plantagenet Cherokee"/>
+        <a:font script="Yiii" typeface="Microsoft Yi Baiti"/>
+        <a:font script="Tibt" typeface="Microsoft Himalaya"/>
+        <a:font script="Thaa" typeface="MV Boli"/>
+        <a:font script="Deva" typeface="Mangal"/>
+        <a:font script="Telu" typeface="Gautami"/>
+        <a:font script="Taml" typeface="Latha"/>
+        <a:font script="Syrc" typeface="Estrangelo Edessa"/>
+        <a:font script="Orya" typeface="Kalinga"/>
+        <a:font script="Mlym" typeface="Kartika"/>
+        <a:font script="Laoo" typeface="DokChampa"/>
+        <a:font script="Sinh" typeface="Iskoola Pota"/>
+        <a:font script="Mong" typeface="Mongolian Baiti"/>
+        <a:font script="Viet" typeface="Times New Roman"/>
+        <a:font script="Uigh" typeface="Microsoft Uighur"/>
+        <a:font script="Geor" typeface="Sylfaen"/>
+      </a:majorFont>
+      <a:minorFont>
+        <a:latin typeface="Calibri"/>
+        <a:ea typeface=""/>
+        <a:cs typeface=""/>
+        <a:font script="Jpan" typeface="ＭＳ Ｐゴシック"/>
+        <a:font script="Hang" typeface="맑은 고딕"/>
+        <a:font script="Hans" typeface="宋体"/>
+        <a:font script="Hant" typeface="新細明體"/>
+        <a:font script="Arab" typeface="Arial"/>
+        <a:font script="Hebr" typeface="Arial"/>
+        <a:font script="Thai" typeface="Cordia New"/>
+        <a:font script="Ethi" typeface="Nyala"/>
+        <a:font script="Beng" typeface="Vrinda"/>
+        <a:font script="Gujr" typeface="Shruti"/>
+        <a:font script="Khmr" typeface="DaunPenh"/>
+        <a:font script="Knda" typeface="Tunga"/>
+        <a:font script="Guru" typeface="Raavi"/>
+        <a:font script="Cans" typeface="Euphemia"/>
+        <a:font script="Cher" typeface="Plantagenet Cherokee"/>
+        <a:font script="Yiii" typeface="Microsoft Yi Baiti"/>
+        <a:font script="Tibt" typeface="Microsoft Himalaya"/>
+        <a:font script="Thaa" typeface="MV Boli"/>
+        <a:font script="Deva" typeface="Mangal"/>
+        <a:font script="Telu" typeface="Gautami"/>
+        <a:font script="Taml" typeface="Latha"/>
+        <a:font script="Syrc" typeface="Estrangelo Edessa"/>
+        <a:font script="Orya" typeface="Kalinga"/>
+        <a:font script="Mlym" typeface="Kartika"/>
+        <a:font script="Laoo" typeface="DokChampa"/>
+        <a:font script="Sinh" typeface="Iskoola Pota"/>
+        <a:font script="Mong" typeface="Mongolian Baiti"/>
+        <a:font script="Viet" typeface="Arial"/>
+        <a:font script="Uigh" typeface="Microsoft Uighur"/>
+        <a:font script="Geor" typeface="Sylfaen"/>
+      </a:minorFont>
+    </a:fontScheme>
+    <a:fmtScheme name="Office">
+      <a:fillStyleLst>
+        <a:solidFill>
+          <a:schemeClr val="phClr"/>
+        </a:solidFill>
+        <a:gradFill rotWithShape="1">
+          <a:gsLst>
+            <a:gs pos="0">
+              <a:schemeClr val="phClr">
+                <a:tint val="50000"/>
+                <a:satMod val="300000"/>
+              </a:schemeClr>
+            </a:gs>
+            <a:gs pos="35000">
+              <a:schemeClr val="phClr">
+                <a:tint val="37000"/>
+                <a:satMod val="300000"/>
+              </a:schemeClr>
+            </a:gs>
+            <a:gs pos="100000">
+              <a:schemeClr val="phClr">
+                <a:tint val="15000"/>
+                <a:satMod val="350000"/>
+              </a:schemeClr>
+            </a:gs>
+          </a:gsLst>
+          <a:lin ang="16200000" scaled="1"/>
+        </a:gradFill>
+        <a:gradFill rotWithShape="1">
+          <a:gsLst>
+            <a:gs pos="0">
+              <a:schemeClr val="phClr">
+                <a:shade val="51000"/>
+                <a:satMod val="130000"/>
+              </a:schemeClr>
+            </a:gs>
+            <a:gs pos="80000">
+              <a:schemeClr val="phClr">
+                <a:shade val="93000"/>
+                <a:satMod val="130000"/>
+              </a:schemeClr>
+            </a:gs>
+            <a:gs pos="100000">
+              <a:schemeClr val="phClr">
+                <a:shade val="94000"/>
+                <a:satMod val="135000"/>
+              </a:schemeClr>
+            </a:gs>
+          </a:gsLst>
+          <a:lin ang="16200000" scaled="0"/>
+        </a:gradFill>
+      </a:fillStyleLst>
+      <a:lnStyleLst>
+        <a:ln w="9525" cap="flat" cmpd="sng" algn="ctr">
+          <a:solidFill>
+            <a:schemeClr val="phClr">
+              <a:shade val="95000"/>
+              <a:satMod val="105000"/>
+            </a:schemeClr>
+          </a:solidFill>
+          <a:prstDash val="solid"/>
+        </a:ln>
+        <a:ln w="25400" cap="flat" cmpd="sng" algn="ctr">
+          <a:solidFill>
+            <a:schemeClr val="phClr"/>
+          </a:solidFill>
+          <a:prstDash val="solid"/>
+        </a:ln>
+        <a:ln w="38100" cap="flat" cmpd="sng" algn="ctr">
+          <a:solidFill>
+            <a:schemeClr val="phClr"/>
+          </a:solidFill>
+          <a:prstDash val="solid"/>
+        </a:ln>
+      </a:lnStyleLst>
+      <a:effectStyleLst>
+        <a:effectStyle>
+          <a:effectLst>
+            <a:outerShdw blurRad="40000" dist="20000" dir="5400000" rotWithShape="0">
+              <a:srgbClr val="000000">
+                <a:alpha val="38000"/>
+              </a:srgbClr>
+            </a:outerShdw>
+          </a:effectLst>
+        </a:effectStyle>
+        <a:effectStyle>
+          <a:effectLst>
+            <a:outerShdw blurRad="40000" dist="23000" dir="5400000" rotWithShape="0">
+              <a:srgbClr val="000000">
+                <a:alpha val="35000"/>
+              </a:srgbClr>
+            </a:outerShdw>
+          </a:effectLst>
+        </a:effectStyle>
+        <a:effectStyle>
+          <a:effectLst>
+            <a:outerShdw blurRad="40000" dist="23000" dir="5400000" rotWithShape="0">
+              <a:srgbClr val="000000">
+                <a:alpha val="35000"/>
+              </a:srgbClr>
+            </a:outerShdw>
+          </a:effectLst>
+          <a:scene3d>
+            <a:camera prst="orthographicFront">
+              <a:rot lat="0" lon="0" rev="0"/>
+            </a:camera>
+            <a:lightRig rig="threePt" dir="t">
+              <a:rot lat="0" lon="0" rev="1200000"/>
+            </a:lightRig>
+          </a:scene3d>
+          <a:sp3d>
+            <a:bevelT w="63500" h="25400"/>
+          </a:sp3d>
+        </a:effectStyle>
+      </a:effectStyleLst>
+      <a:bgFillStyleLst>
+        <a:solidFill>
+          <a:schemeClr val="phClr"/>
+        </a:solidFill>
+        <a:gradFill rotWithShape="1">
+          <a:gsLst>
+            <a:gs pos="0">
+              <a:schemeClr val="phClr">
+                <a:tint val="40000"/>
+                <a:satMod val="350000"/>
+              </a:schemeClr>
+            </a:gs>
+            <a:gs pos="40000">
+              <a:schemeClr val="phClr">
+                <a:tint val="45000"/>
+                <a:shade val="99000"/>
+                <a:satMod val="350000"/>
+              </a:schemeClr>
+            </a:gs>
+            <a:gs pos="100000">
+              <a:schemeClr val="phClr">
+                <a:shade val="20000"/>
+                <a:satMod val="255000"/>
+              </a:schemeClr>
+            </a:gs>
+          </a:gsLst>
+          <a:path path="circle">
+            <a:fillToRect l="50000" t="-80000" r="50000" b="180000"/>
+          </a:path>
+        </a:gradFill>
+        <a:gradFill rotWithShape="1">
+          <a:gsLst>
+            <a:gs pos="0">
+              <a:schemeClr val="phClr">
+                <a:tint val="80000"/>
+                <a:satMod val="300000"/>
+              </a:schemeClr>
+            </a:gs>
+            <a:gs pos="100000">
+              <a:schemeClr val="phClr">
+                <a:shade val="30000"/>
+                <a:satMod val="200000"/>
+              </a:schemeClr>
+            </a:gs>
+          </a:gsLst>
+          <a:path path="circle">
+            <a:fillToRect l="50000" t="50000" r="50000" b="50000"/>
+          </a:path>
+        </a:gradFill>
+      </a:bgFillStyleLst>
+    </a:fmtScheme>
+  </a:themeElements>
+  <a:objectDefaults/>
+  <a:extraClrSchemeLst/>
+</a:theme>
 </file>
</xml_diff>

<commit_message>
fixed header for small screens, updated slide deck
</commit_message>
<xml_diff>
--- a/ppt/Slide Deck.pptx
+++ b/ppt/Slide Deck.pptx
@@ -197,7 +197,7 @@
           <a:p>
             <a:fld id="{3E860FF5-3020-4B9C-ABD5-65ABBC874B95}" type="datetimeFigureOut">
               <a:rPr lang="en-AU" smtClean="0"/>
-              <a:t>7/11/2022</a:t>
+              <a:t>9/11/2022</a:t>
             </a:fld>
             <a:endParaRPr lang="en-AU"/>
           </a:p>
@@ -998,7 +998,7 @@
           <a:p>
             <a:fld id="{30C82057-5E07-49DC-A834-E014E79DC199}" type="datetimeFigureOut">
               <a:rPr lang="en-AU" smtClean="0"/>
-              <a:t>7/11/2022</a:t>
+              <a:t>9/11/2022</a:t>
             </a:fld>
             <a:endParaRPr lang="en-AU"/>
           </a:p>
@@ -1168,7 +1168,7 @@
           <a:p>
             <a:fld id="{30C82057-5E07-49DC-A834-E014E79DC199}" type="datetimeFigureOut">
               <a:rPr lang="en-AU" smtClean="0"/>
-              <a:t>7/11/2022</a:t>
+              <a:t>9/11/2022</a:t>
             </a:fld>
             <a:endParaRPr lang="en-AU"/>
           </a:p>
@@ -1348,7 +1348,7 @@
           <a:p>
             <a:fld id="{30C82057-5E07-49DC-A834-E014E79DC199}" type="datetimeFigureOut">
               <a:rPr lang="en-AU" smtClean="0"/>
-              <a:t>7/11/2022</a:t>
+              <a:t>9/11/2022</a:t>
             </a:fld>
             <a:endParaRPr lang="en-AU"/>
           </a:p>
@@ -1518,7 +1518,7 @@
           <a:p>
             <a:fld id="{30C82057-5E07-49DC-A834-E014E79DC199}" type="datetimeFigureOut">
               <a:rPr lang="en-AU" smtClean="0"/>
-              <a:t>7/11/2022</a:t>
+              <a:t>9/11/2022</a:t>
             </a:fld>
             <a:endParaRPr lang="en-AU"/>
           </a:p>
@@ -1764,7 +1764,7 @@
           <a:p>
             <a:fld id="{30C82057-5E07-49DC-A834-E014E79DC199}" type="datetimeFigureOut">
               <a:rPr lang="en-AU" smtClean="0"/>
-              <a:t>7/11/2022</a:t>
+              <a:t>9/11/2022</a:t>
             </a:fld>
             <a:endParaRPr lang="en-AU"/>
           </a:p>
@@ -2052,7 +2052,7 @@
           <a:p>
             <a:fld id="{30C82057-5E07-49DC-A834-E014E79DC199}" type="datetimeFigureOut">
               <a:rPr lang="en-AU" smtClean="0"/>
-              <a:t>7/11/2022</a:t>
+              <a:t>9/11/2022</a:t>
             </a:fld>
             <a:endParaRPr lang="en-AU"/>
           </a:p>
@@ -2474,7 +2474,7 @@
           <a:p>
             <a:fld id="{30C82057-5E07-49DC-A834-E014E79DC199}" type="datetimeFigureOut">
               <a:rPr lang="en-AU" smtClean="0"/>
-              <a:t>7/11/2022</a:t>
+              <a:t>9/11/2022</a:t>
             </a:fld>
             <a:endParaRPr lang="en-AU"/>
           </a:p>
@@ -2592,7 +2592,7 @@
           <a:p>
             <a:fld id="{30C82057-5E07-49DC-A834-E014E79DC199}" type="datetimeFigureOut">
               <a:rPr lang="en-AU" smtClean="0"/>
-              <a:t>7/11/2022</a:t>
+              <a:t>9/11/2022</a:t>
             </a:fld>
             <a:endParaRPr lang="en-AU"/>
           </a:p>
@@ -2687,7 +2687,7 @@
           <a:p>
             <a:fld id="{30C82057-5E07-49DC-A834-E014E79DC199}" type="datetimeFigureOut">
               <a:rPr lang="en-AU" smtClean="0"/>
-              <a:t>7/11/2022</a:t>
+              <a:t>9/11/2022</a:t>
             </a:fld>
             <a:endParaRPr lang="en-AU"/>
           </a:p>
@@ -2964,7 +2964,7 @@
           <a:p>
             <a:fld id="{30C82057-5E07-49DC-A834-E014E79DC199}" type="datetimeFigureOut">
               <a:rPr lang="en-AU" smtClean="0"/>
-              <a:t>7/11/2022</a:t>
+              <a:t>9/11/2022</a:t>
             </a:fld>
             <a:endParaRPr lang="en-AU"/>
           </a:p>
@@ -3217,7 +3217,7 @@
           <a:p>
             <a:fld id="{30C82057-5E07-49DC-A834-E014E79DC199}" type="datetimeFigureOut">
               <a:rPr lang="en-AU" smtClean="0"/>
-              <a:t>7/11/2022</a:t>
+              <a:t>9/11/2022</a:t>
             </a:fld>
             <a:endParaRPr lang="en-AU"/>
           </a:p>
@@ -3430,7 +3430,7 @@
           <a:p>
             <a:fld id="{30C82057-5E07-49DC-A834-E014E79DC199}" type="datetimeFigureOut">
               <a:rPr lang="en-AU" smtClean="0"/>
-              <a:t>7/11/2022</a:t>
+              <a:t>9/11/2022</a:t>
             </a:fld>
             <a:endParaRPr lang="en-AU"/>
           </a:p>
@@ -3861,7 +3861,7 @@
           <p:nvPr/>
         </p:nvPicPr>
         <p:blipFill>
-          <a:blip r:embed="rId3">
+          <a:blip r:embed="rId5">
             <a:extLst>
               <a:ext uri="{28A0092B-C50C-407E-A947-70E740481C1C}">
                 <a14:useLocalDpi xmlns:a14="http://schemas.microsoft.com/office/drawing/2010/main" val="0"/>
@@ -3882,6 +3882,39 @@
           </a:prstGeom>
         </p:spPr>
       </p:pic>
+      <p:pic>
+        <p:nvPicPr>
+          <p:cNvPr id="8" name="Audio 7">
+            <a:hlinkClick r:id="" action="ppaction://media"/>
+          </p:cNvPr>
+          <p:cNvPicPr>
+            <a:picLocks noChangeAspect="1"/>
+          </p:cNvPicPr>
+          <p:nvPr>
+            <a:audioFile r:link="rId2"/>
+            <p:extLst>
+              <p:ext uri="{DAA4B4D4-6D71-4841-9C94-3DE7FCFB9230}">
+                <p14:media xmlns:p14="http://schemas.microsoft.com/office/powerpoint/2010/main" r:embed="rId1"/>
+              </p:ext>
+            </p:extLst>
+          </p:nvPr>
+        </p:nvPicPr>
+        <p:blipFill>
+          <a:blip r:embed="rId6"/>
+          <a:stretch>
+            <a:fillRect/>
+          </a:stretch>
+        </p:blipFill>
+        <p:spPr>
+          <a:xfrm>
+            <a:off x="8440738" y="6154738"/>
+            <a:ext cx="487362" cy="487362"/>
+          </a:xfrm>
+          <a:prstGeom prst="rect">
+            <a:avLst/>
+          </a:prstGeom>
+        </p:spPr>
+      </p:pic>
     </p:spTree>
     <p:extLst>
       <p:ext uri="{BB962C8B-B14F-4D97-AF65-F5344CB8AC3E}">
@@ -3892,6 +3925,101 @@
   <p:clrMapOvr>
     <a:masterClrMapping/>
   </p:clrMapOvr>
+  <mc:AlternateContent xmlns:mc="http://schemas.openxmlformats.org/markup-compatibility/2006">
+    <mc:Choice xmlns:p14="http://schemas.microsoft.com/office/powerpoint/2010/main" Requires="p14">
+      <p:transition spd="slow" p14:dur="2000" advTm="2297"/>
+    </mc:Choice>
+    <mc:Fallback>
+      <p:transition spd="slow" advTm="2297"/>
+    </mc:Fallback>
+  </mc:AlternateContent>
+  <p:timing>
+    <p:tnLst>
+      <p:par>
+        <p:cTn id="1" dur="indefinite" restart="never" nodeType="tmRoot">
+          <p:childTnLst>
+            <p:seq concurrent="1" nextAc="seek">
+              <p:cTn id="2" dur="indefinite" nodeType="mainSeq">
+                <p:childTnLst>
+                  <p:par>
+                    <p:cTn id="3" fill="hold">
+                      <p:stCondLst>
+                        <p:cond delay="indefinite"/>
+                        <p:cond evt="onBegin" delay="0">
+                          <p:tn val="2"/>
+                        </p:cond>
+                      </p:stCondLst>
+                      <p:childTnLst>
+                        <p:par>
+                          <p:cTn id="4" fill="hold">
+                            <p:stCondLst>
+                              <p:cond delay="0"/>
+                            </p:stCondLst>
+                            <p:childTnLst>
+                              <p:par>
+                                <p:cTn id="5" presetID="1" presetClass="mediacall" presetSubtype="0" fill="hold" nodeType="afterEffect">
+                                  <p:stCondLst>
+                                    <p:cond delay="0"/>
+                                  </p:stCondLst>
+                                  <p:childTnLst>
+                                    <p:cmd type="call" cmd="playFrom(0.0)">
+                                      <p:cBhvr>
+                                        <p:cTn id="6" dur="1" fill="hold"/>
+                                        <p:tgtEl>
+                                          <p:spTgt spid="8"/>
+                                        </p:tgtEl>
+                                      </p:cBhvr>
+                                    </p:cmd>
+                                  </p:childTnLst>
+                                </p:cTn>
+                              </p:par>
+                            </p:childTnLst>
+                          </p:cTn>
+                        </p:par>
+                      </p:childTnLst>
+                    </p:cTn>
+                  </p:par>
+                </p:childTnLst>
+              </p:cTn>
+              <p:prevCondLst>
+                <p:cond evt="onPrev" delay="0">
+                  <p:tgtEl>
+                    <p:sldTgt/>
+                  </p:tgtEl>
+                </p:cond>
+              </p:prevCondLst>
+              <p:nextCondLst>
+                <p:cond evt="onNext" delay="0">
+                  <p:tgtEl>
+                    <p:sldTgt/>
+                  </p:tgtEl>
+                </p:cond>
+              </p:nextCondLst>
+            </p:seq>
+            <p:audio isNarration="1">
+              <p:cMediaNode vol="80000" showWhenStopped="0">
+                <p:cTn id="7" fill="hold" display="0">
+                  <p:stCondLst>
+                    <p:cond delay="indefinite"/>
+                  </p:stCondLst>
+                  <p:endCondLst>
+                    <p:cond evt="onStopAudio" delay="0">
+                      <p:tgtEl>
+                        <p:sldTgt/>
+                      </p:tgtEl>
+                    </p:cond>
+                  </p:endCondLst>
+                </p:cTn>
+                <p:tgtEl>
+                  <p:spTgt spid="8"/>
+                </p:tgtEl>
+              </p:cMediaNode>
+            </p:audio>
+          </p:childTnLst>
+        </p:cTn>
+      </p:par>
+    </p:tnLst>
+  </p:timing>
 </p:sld>
 </file>
 
@@ -3968,7 +4096,7 @@
           <p:nvPr/>
         </p:nvPicPr>
         <p:blipFill>
-          <a:blip r:embed="rId3">
+          <a:blip r:embed="rId5">
             <a:extLst>
               <a:ext uri="{28A0092B-C50C-407E-A947-70E740481C1C}">
                 <a14:useLocalDpi xmlns:a14="http://schemas.microsoft.com/office/drawing/2010/main" val="0"/>
@@ -3989,6 +4117,39 @@
           </a:prstGeom>
         </p:spPr>
       </p:pic>
+      <p:pic>
+        <p:nvPicPr>
+          <p:cNvPr id="8" name="Audio 7">
+            <a:hlinkClick r:id="" action="ppaction://media"/>
+          </p:cNvPr>
+          <p:cNvPicPr>
+            <a:picLocks noChangeAspect="1"/>
+          </p:cNvPicPr>
+          <p:nvPr>
+            <a:audioFile r:link="rId2"/>
+            <p:extLst>
+              <p:ext uri="{DAA4B4D4-6D71-4841-9C94-3DE7FCFB9230}">
+                <p14:media xmlns:p14="http://schemas.microsoft.com/office/powerpoint/2010/main" r:embed="rId1"/>
+              </p:ext>
+            </p:extLst>
+          </p:nvPr>
+        </p:nvPicPr>
+        <p:blipFill>
+          <a:blip r:embed="rId6"/>
+          <a:stretch>
+            <a:fillRect/>
+          </a:stretch>
+        </p:blipFill>
+        <p:spPr>
+          <a:xfrm>
+            <a:off x="8440738" y="6154738"/>
+            <a:ext cx="487362" cy="487362"/>
+          </a:xfrm>
+          <a:prstGeom prst="rect">
+            <a:avLst/>
+          </a:prstGeom>
+        </p:spPr>
+      </p:pic>
     </p:spTree>
     <p:extLst>
       <p:ext uri="{BB962C8B-B14F-4D97-AF65-F5344CB8AC3E}">
@@ -3999,6 +4160,101 @@
   <p:clrMapOvr>
     <a:masterClrMapping/>
   </p:clrMapOvr>
+  <mc:AlternateContent xmlns:mc="http://schemas.openxmlformats.org/markup-compatibility/2006">
+    <mc:Choice xmlns:p14="http://schemas.microsoft.com/office/powerpoint/2010/main" Requires="p14">
+      <p:transition spd="slow" p14:dur="2000" advTm="2248"/>
+    </mc:Choice>
+    <mc:Fallback>
+      <p:transition spd="slow" advTm="2248"/>
+    </mc:Fallback>
+  </mc:AlternateContent>
+  <p:timing>
+    <p:tnLst>
+      <p:par>
+        <p:cTn id="1" dur="indefinite" restart="never" nodeType="tmRoot">
+          <p:childTnLst>
+            <p:seq concurrent="1" nextAc="seek">
+              <p:cTn id="2" dur="indefinite" nodeType="mainSeq">
+                <p:childTnLst>
+                  <p:par>
+                    <p:cTn id="3" fill="hold">
+                      <p:stCondLst>
+                        <p:cond delay="indefinite"/>
+                        <p:cond evt="onBegin" delay="0">
+                          <p:tn val="2"/>
+                        </p:cond>
+                      </p:stCondLst>
+                      <p:childTnLst>
+                        <p:par>
+                          <p:cTn id="4" fill="hold">
+                            <p:stCondLst>
+                              <p:cond delay="0"/>
+                            </p:stCondLst>
+                            <p:childTnLst>
+                              <p:par>
+                                <p:cTn id="5" presetID="1" presetClass="mediacall" presetSubtype="0" fill="hold" nodeType="afterEffect">
+                                  <p:stCondLst>
+                                    <p:cond delay="0"/>
+                                  </p:stCondLst>
+                                  <p:childTnLst>
+                                    <p:cmd type="call" cmd="playFrom(0.0)">
+                                      <p:cBhvr>
+                                        <p:cTn id="6" dur="1" fill="hold"/>
+                                        <p:tgtEl>
+                                          <p:spTgt spid="8"/>
+                                        </p:tgtEl>
+                                      </p:cBhvr>
+                                    </p:cmd>
+                                  </p:childTnLst>
+                                </p:cTn>
+                              </p:par>
+                            </p:childTnLst>
+                          </p:cTn>
+                        </p:par>
+                      </p:childTnLst>
+                    </p:cTn>
+                  </p:par>
+                </p:childTnLst>
+              </p:cTn>
+              <p:prevCondLst>
+                <p:cond evt="onPrev" delay="0">
+                  <p:tgtEl>
+                    <p:sldTgt/>
+                  </p:tgtEl>
+                </p:cond>
+              </p:prevCondLst>
+              <p:nextCondLst>
+                <p:cond evt="onNext" delay="0">
+                  <p:tgtEl>
+                    <p:sldTgt/>
+                  </p:tgtEl>
+                </p:cond>
+              </p:nextCondLst>
+            </p:seq>
+            <p:audio isNarration="1">
+              <p:cMediaNode vol="80000" showWhenStopped="0">
+                <p:cTn id="7" fill="hold" display="0">
+                  <p:stCondLst>
+                    <p:cond delay="indefinite"/>
+                  </p:stCondLst>
+                  <p:endCondLst>
+                    <p:cond evt="onStopAudio" delay="0">
+                      <p:tgtEl>
+                        <p:sldTgt/>
+                      </p:tgtEl>
+                    </p:cond>
+                  </p:endCondLst>
+                </p:cTn>
+                <p:tgtEl>
+                  <p:spTgt spid="8"/>
+                </p:tgtEl>
+              </p:cMediaNode>
+            </p:audio>
+          </p:childTnLst>
+        </p:cTn>
+      </p:par>
+    </p:tnLst>
+  </p:timing>
 </p:sld>
 </file>
 
@@ -4075,7 +4331,7 @@
           <p:nvPr/>
         </p:nvPicPr>
         <p:blipFill>
-          <a:blip r:embed="rId3">
+          <a:blip r:embed="rId5">
             <a:extLst>
               <a:ext uri="{28A0092B-C50C-407E-A947-70E740481C1C}">
                 <a14:useLocalDpi xmlns:a14="http://schemas.microsoft.com/office/drawing/2010/main" val="0"/>
@@ -4096,6 +4352,39 @@
           </a:prstGeom>
         </p:spPr>
       </p:pic>
+      <p:pic>
+        <p:nvPicPr>
+          <p:cNvPr id="8" name="Audio 7">
+            <a:hlinkClick r:id="" action="ppaction://media"/>
+          </p:cNvPr>
+          <p:cNvPicPr>
+            <a:picLocks noChangeAspect="1"/>
+          </p:cNvPicPr>
+          <p:nvPr>
+            <a:audioFile r:link="rId2"/>
+            <p:extLst>
+              <p:ext uri="{DAA4B4D4-6D71-4841-9C94-3DE7FCFB9230}">
+                <p14:media xmlns:p14="http://schemas.microsoft.com/office/powerpoint/2010/main" r:embed="rId1"/>
+              </p:ext>
+            </p:extLst>
+          </p:nvPr>
+        </p:nvPicPr>
+        <p:blipFill>
+          <a:blip r:embed="rId6"/>
+          <a:stretch>
+            <a:fillRect/>
+          </a:stretch>
+        </p:blipFill>
+        <p:spPr>
+          <a:xfrm>
+            <a:off x="8440738" y="6154738"/>
+            <a:ext cx="487362" cy="487362"/>
+          </a:xfrm>
+          <a:prstGeom prst="rect">
+            <a:avLst/>
+          </a:prstGeom>
+        </p:spPr>
+      </p:pic>
     </p:spTree>
     <p:extLst>
       <p:ext uri="{BB962C8B-B14F-4D97-AF65-F5344CB8AC3E}">
@@ -4106,6 +4395,101 @@
   <p:clrMapOvr>
     <a:masterClrMapping/>
   </p:clrMapOvr>
+  <mc:AlternateContent xmlns:mc="http://schemas.openxmlformats.org/markup-compatibility/2006">
+    <mc:Choice xmlns:p14="http://schemas.microsoft.com/office/powerpoint/2010/main" Requires="p14">
+      <p:transition spd="slow" p14:dur="2000" advTm="1360"/>
+    </mc:Choice>
+    <mc:Fallback>
+      <p:transition spd="slow" advTm="1360"/>
+    </mc:Fallback>
+  </mc:AlternateContent>
+  <p:timing>
+    <p:tnLst>
+      <p:par>
+        <p:cTn id="1" dur="indefinite" restart="never" nodeType="tmRoot">
+          <p:childTnLst>
+            <p:seq concurrent="1" nextAc="seek">
+              <p:cTn id="2" dur="indefinite" nodeType="mainSeq">
+                <p:childTnLst>
+                  <p:par>
+                    <p:cTn id="3" fill="hold">
+                      <p:stCondLst>
+                        <p:cond delay="indefinite"/>
+                        <p:cond evt="onBegin" delay="0">
+                          <p:tn val="2"/>
+                        </p:cond>
+                      </p:stCondLst>
+                      <p:childTnLst>
+                        <p:par>
+                          <p:cTn id="4" fill="hold">
+                            <p:stCondLst>
+                              <p:cond delay="0"/>
+                            </p:stCondLst>
+                            <p:childTnLst>
+                              <p:par>
+                                <p:cTn id="5" presetID="1" presetClass="mediacall" presetSubtype="0" fill="hold" nodeType="afterEffect">
+                                  <p:stCondLst>
+                                    <p:cond delay="0"/>
+                                  </p:stCondLst>
+                                  <p:childTnLst>
+                                    <p:cmd type="call" cmd="playFrom(0.0)">
+                                      <p:cBhvr>
+                                        <p:cTn id="6" dur="1" fill="hold"/>
+                                        <p:tgtEl>
+                                          <p:spTgt spid="8"/>
+                                        </p:tgtEl>
+                                      </p:cBhvr>
+                                    </p:cmd>
+                                  </p:childTnLst>
+                                </p:cTn>
+                              </p:par>
+                            </p:childTnLst>
+                          </p:cTn>
+                        </p:par>
+                      </p:childTnLst>
+                    </p:cTn>
+                  </p:par>
+                </p:childTnLst>
+              </p:cTn>
+              <p:prevCondLst>
+                <p:cond evt="onPrev" delay="0">
+                  <p:tgtEl>
+                    <p:sldTgt/>
+                  </p:tgtEl>
+                </p:cond>
+              </p:prevCondLst>
+              <p:nextCondLst>
+                <p:cond evt="onNext" delay="0">
+                  <p:tgtEl>
+                    <p:sldTgt/>
+                  </p:tgtEl>
+                </p:cond>
+              </p:nextCondLst>
+            </p:seq>
+            <p:audio isNarration="1">
+              <p:cMediaNode vol="80000" showWhenStopped="0">
+                <p:cTn id="7" fill="hold" display="0">
+                  <p:stCondLst>
+                    <p:cond delay="indefinite"/>
+                  </p:stCondLst>
+                  <p:endCondLst>
+                    <p:cond evt="onStopAudio" delay="0">
+                      <p:tgtEl>
+                        <p:sldTgt/>
+                      </p:tgtEl>
+                    </p:cond>
+                  </p:endCondLst>
+                </p:cTn>
+                <p:tgtEl>
+                  <p:spTgt spid="8"/>
+                </p:tgtEl>
+              </p:cMediaNode>
+            </p:audio>
+          </p:childTnLst>
+        </p:cTn>
+      </p:par>
+    </p:tnLst>
+  </p:timing>
 </p:sld>
 </file>
 
@@ -4182,7 +4566,7 @@
           <p:nvPr/>
         </p:nvPicPr>
         <p:blipFill>
-          <a:blip r:embed="rId3">
+          <a:blip r:embed="rId5">
             <a:extLst>
               <a:ext uri="{28A0092B-C50C-407E-A947-70E740481C1C}">
                 <a14:useLocalDpi xmlns:a14="http://schemas.microsoft.com/office/drawing/2010/main" val="0"/>
@@ -4195,8 +4579,41 @@
         </p:blipFill>
         <p:spPr>
           <a:xfrm>
-            <a:off x="1403648" y="1340768"/>
+            <a:off x="1763687" y="1196876"/>
             <a:ext cx="6073975" cy="5445224"/>
+          </a:xfrm>
+          <a:prstGeom prst="rect">
+            <a:avLst/>
+          </a:prstGeom>
+        </p:spPr>
+      </p:pic>
+      <p:pic>
+        <p:nvPicPr>
+          <p:cNvPr id="8" name="Audio 7">
+            <a:hlinkClick r:id="" action="ppaction://media"/>
+          </p:cNvPr>
+          <p:cNvPicPr>
+            <a:picLocks noChangeAspect="1"/>
+          </p:cNvPicPr>
+          <p:nvPr>
+            <a:audioFile r:link="rId2"/>
+            <p:extLst>
+              <p:ext uri="{DAA4B4D4-6D71-4841-9C94-3DE7FCFB9230}">
+                <p14:media xmlns:p14="http://schemas.microsoft.com/office/powerpoint/2010/main" r:embed="rId1"/>
+              </p:ext>
+            </p:extLst>
+          </p:nvPr>
+        </p:nvPicPr>
+        <p:blipFill>
+          <a:blip r:embed="rId6"/>
+          <a:stretch>
+            <a:fillRect/>
+          </a:stretch>
+        </p:blipFill>
+        <p:spPr>
+          <a:xfrm>
+            <a:off x="8440738" y="6154738"/>
+            <a:ext cx="487362" cy="487362"/>
           </a:xfrm>
           <a:prstGeom prst="rect">
             <a:avLst/>
@@ -4213,6 +4630,101 @@
   <p:clrMapOvr>
     <a:masterClrMapping/>
   </p:clrMapOvr>
+  <mc:AlternateContent xmlns:mc="http://schemas.openxmlformats.org/markup-compatibility/2006">
+    <mc:Choice xmlns:p14="http://schemas.microsoft.com/office/powerpoint/2010/main" Requires="p14">
+      <p:transition spd="slow" p14:dur="2000" advTm="1496"/>
+    </mc:Choice>
+    <mc:Fallback>
+      <p:transition spd="slow" advTm="1496"/>
+    </mc:Fallback>
+  </mc:AlternateContent>
+  <p:timing>
+    <p:tnLst>
+      <p:par>
+        <p:cTn id="1" dur="indefinite" restart="never" nodeType="tmRoot">
+          <p:childTnLst>
+            <p:seq concurrent="1" nextAc="seek">
+              <p:cTn id="2" dur="indefinite" nodeType="mainSeq">
+                <p:childTnLst>
+                  <p:par>
+                    <p:cTn id="3" fill="hold">
+                      <p:stCondLst>
+                        <p:cond delay="indefinite"/>
+                        <p:cond evt="onBegin" delay="0">
+                          <p:tn val="2"/>
+                        </p:cond>
+                      </p:stCondLst>
+                      <p:childTnLst>
+                        <p:par>
+                          <p:cTn id="4" fill="hold">
+                            <p:stCondLst>
+                              <p:cond delay="0"/>
+                            </p:stCondLst>
+                            <p:childTnLst>
+                              <p:par>
+                                <p:cTn id="5" presetID="1" presetClass="mediacall" presetSubtype="0" fill="hold" nodeType="afterEffect">
+                                  <p:stCondLst>
+                                    <p:cond delay="0"/>
+                                  </p:stCondLst>
+                                  <p:childTnLst>
+                                    <p:cmd type="call" cmd="playFrom(0.0)">
+                                      <p:cBhvr>
+                                        <p:cTn id="6" dur="1" fill="hold"/>
+                                        <p:tgtEl>
+                                          <p:spTgt spid="8"/>
+                                        </p:tgtEl>
+                                      </p:cBhvr>
+                                    </p:cmd>
+                                  </p:childTnLst>
+                                </p:cTn>
+                              </p:par>
+                            </p:childTnLst>
+                          </p:cTn>
+                        </p:par>
+                      </p:childTnLst>
+                    </p:cTn>
+                  </p:par>
+                </p:childTnLst>
+              </p:cTn>
+              <p:prevCondLst>
+                <p:cond evt="onPrev" delay="0">
+                  <p:tgtEl>
+                    <p:sldTgt/>
+                  </p:tgtEl>
+                </p:cond>
+              </p:prevCondLst>
+              <p:nextCondLst>
+                <p:cond evt="onNext" delay="0">
+                  <p:tgtEl>
+                    <p:sldTgt/>
+                  </p:tgtEl>
+                </p:cond>
+              </p:nextCondLst>
+            </p:seq>
+            <p:audio isNarration="1">
+              <p:cMediaNode vol="80000" showWhenStopped="0">
+                <p:cTn id="7" fill="hold" display="0">
+                  <p:stCondLst>
+                    <p:cond delay="indefinite"/>
+                  </p:stCondLst>
+                  <p:endCondLst>
+                    <p:cond evt="onStopAudio" delay="0">
+                      <p:tgtEl>
+                        <p:sldTgt/>
+                      </p:tgtEl>
+                    </p:cond>
+                  </p:endCondLst>
+                </p:cTn>
+                <p:tgtEl>
+                  <p:spTgt spid="8"/>
+                </p:tgtEl>
+              </p:cMediaNode>
+            </p:audio>
+          </p:childTnLst>
+        </p:cTn>
+      </p:par>
+    </p:tnLst>
+  </p:timing>
 </p:sld>
 </file>
 
@@ -4273,18 +4785,59 @@
           <a:p>
             <a:r>
               <a:rPr lang="en-AU" dirty="0" smtClean="0"/>
-              <a:t>Looked at multiple web designs and got inspiration for coding. </a:t>
-            </a:r>
-          </a:p>
-          <a:p>
+              <a:t>I Looked </a:t>
+            </a:r>
             <a:r>
               <a:rPr lang="en-AU" dirty="0" smtClean="0"/>
-              <a:t>I tried to get the best of all of them</a:t>
+              <a:t>at multiple web designs and got inspiration for coding. </a:t>
+            </a:r>
+          </a:p>
+          <a:p>
+            <a:r>
+              <a:rPr lang="en-AU" dirty="0" smtClean="0"/>
+              <a:t>I tried to get the best of all of </a:t>
+            </a:r>
+            <a:r>
+              <a:rPr lang="en-AU" dirty="0" smtClean="0"/>
+              <a:t>them.</a:t>
             </a:r>
             <a:endParaRPr lang="en-AU" dirty="0"/>
           </a:p>
         </p:txBody>
       </p:sp>
+      <p:pic>
+        <p:nvPicPr>
+          <p:cNvPr id="7" name="Audio 6">
+            <a:hlinkClick r:id="" action="ppaction://media"/>
+          </p:cNvPr>
+          <p:cNvPicPr>
+            <a:picLocks noChangeAspect="1"/>
+          </p:cNvPicPr>
+          <p:nvPr>
+            <a:audioFile r:link="rId2"/>
+            <p:extLst>
+              <p:ext uri="{DAA4B4D4-6D71-4841-9C94-3DE7FCFB9230}">
+                <p14:media xmlns:p14="http://schemas.microsoft.com/office/powerpoint/2010/main" r:embed="rId1"/>
+              </p:ext>
+            </p:extLst>
+          </p:nvPr>
+        </p:nvPicPr>
+        <p:blipFill>
+          <a:blip r:embed="rId4"/>
+          <a:stretch>
+            <a:fillRect/>
+          </a:stretch>
+        </p:blipFill>
+        <p:spPr>
+          <a:xfrm>
+            <a:off x="8440738" y="6154738"/>
+            <a:ext cx="487362" cy="487362"/>
+          </a:xfrm>
+          <a:prstGeom prst="rect">
+            <a:avLst/>
+          </a:prstGeom>
+        </p:spPr>
+      </p:pic>
     </p:spTree>
     <p:extLst>
       <p:ext uri="{BB962C8B-B14F-4D97-AF65-F5344CB8AC3E}">
@@ -4295,6 +4848,101 @@
   <p:clrMapOvr>
     <a:masterClrMapping/>
   </p:clrMapOvr>
+  <mc:AlternateContent xmlns:mc="http://schemas.openxmlformats.org/markup-compatibility/2006">
+    <mc:Choice xmlns:p14="http://schemas.microsoft.com/office/powerpoint/2010/main" Requires="p14">
+      <p:transition spd="slow" p14:dur="2000" advTm="925"/>
+    </mc:Choice>
+    <mc:Fallback>
+      <p:transition spd="slow" advTm="925"/>
+    </mc:Fallback>
+  </mc:AlternateContent>
+  <p:timing>
+    <p:tnLst>
+      <p:par>
+        <p:cTn id="1" dur="indefinite" restart="never" nodeType="tmRoot">
+          <p:childTnLst>
+            <p:seq concurrent="1" nextAc="seek">
+              <p:cTn id="2" dur="indefinite" nodeType="mainSeq">
+                <p:childTnLst>
+                  <p:par>
+                    <p:cTn id="3" fill="hold">
+                      <p:stCondLst>
+                        <p:cond delay="indefinite"/>
+                        <p:cond evt="onBegin" delay="0">
+                          <p:tn val="2"/>
+                        </p:cond>
+                      </p:stCondLst>
+                      <p:childTnLst>
+                        <p:par>
+                          <p:cTn id="4" fill="hold">
+                            <p:stCondLst>
+                              <p:cond delay="0"/>
+                            </p:stCondLst>
+                            <p:childTnLst>
+                              <p:par>
+                                <p:cTn id="5" presetID="1" presetClass="mediacall" presetSubtype="0" fill="hold" nodeType="afterEffect">
+                                  <p:stCondLst>
+                                    <p:cond delay="0"/>
+                                  </p:stCondLst>
+                                  <p:childTnLst>
+                                    <p:cmd type="call" cmd="playFrom(0.0)">
+                                      <p:cBhvr>
+                                        <p:cTn id="6" dur="1" fill="hold"/>
+                                        <p:tgtEl>
+                                          <p:spTgt spid="7"/>
+                                        </p:tgtEl>
+                                      </p:cBhvr>
+                                    </p:cmd>
+                                  </p:childTnLst>
+                                </p:cTn>
+                              </p:par>
+                            </p:childTnLst>
+                          </p:cTn>
+                        </p:par>
+                      </p:childTnLst>
+                    </p:cTn>
+                  </p:par>
+                </p:childTnLst>
+              </p:cTn>
+              <p:prevCondLst>
+                <p:cond evt="onPrev" delay="0">
+                  <p:tgtEl>
+                    <p:sldTgt/>
+                  </p:tgtEl>
+                </p:cond>
+              </p:prevCondLst>
+              <p:nextCondLst>
+                <p:cond evt="onNext" delay="0">
+                  <p:tgtEl>
+                    <p:sldTgt/>
+                  </p:tgtEl>
+                </p:cond>
+              </p:nextCondLst>
+            </p:seq>
+            <p:audio isNarration="1">
+              <p:cMediaNode vol="80000" showWhenStopped="0">
+                <p:cTn id="7" fill="hold" display="0">
+                  <p:stCondLst>
+                    <p:cond delay="indefinite"/>
+                  </p:stCondLst>
+                  <p:endCondLst>
+                    <p:cond evt="onStopAudio" delay="0">
+                      <p:tgtEl>
+                        <p:sldTgt/>
+                      </p:tgtEl>
+                    </p:cond>
+                  </p:endCondLst>
+                </p:cTn>
+                <p:tgtEl>
+                  <p:spTgt spid="7"/>
+                </p:tgtEl>
+              </p:cMediaNode>
+            </p:audio>
+          </p:childTnLst>
+        </p:cTn>
+      </p:par>
+    </p:tnLst>
+  </p:timing>
 </p:sld>
 </file>
 
@@ -4325,7 +4973,12 @@
             <p:ph type="ctrTitle"/>
           </p:nvPr>
         </p:nvSpPr>
-        <p:spPr/>
+        <p:spPr>
+          <a:xfrm>
+            <a:off x="755576" y="764704"/>
+            <a:ext cx="7772400" cy="1470025"/>
+          </a:xfrm>
+        </p:spPr>
         <p:txBody>
           <a:bodyPr/>
           <a:lstStyle/>
@@ -4348,10 +5001,15 @@
             <p:ph type="subTitle" idx="1"/>
           </p:nvPr>
         </p:nvSpPr>
-        <p:spPr/>
+        <p:spPr>
+          <a:xfrm>
+            <a:off x="1331640" y="2276872"/>
+            <a:ext cx="6984776" cy="3240360"/>
+          </a:xfrm>
+        </p:spPr>
         <p:txBody>
           <a:bodyPr>
-            <a:normAutofit fontScale="70000" lnSpcReduction="20000"/>
+            <a:normAutofit fontScale="55000" lnSpcReduction="20000"/>
           </a:bodyPr>
           <a:lstStyle/>
           <a:p>
@@ -4359,10 +5017,6 @@
               <a:buFont typeface="Arial" panose="020B0604020202020204" pitchFamily="34" charset="0"/>
               <a:buChar char="•"/>
             </a:pPr>
-            <a:r>
-              <a:rPr lang="en-AU" dirty="0" smtClean="0"/>
-              <a:t>Challenges: making the flex box work for the small devices. </a:t>
-            </a:r>
             <a:endParaRPr lang="en-AU" dirty="0" smtClean="0"/>
           </a:p>
           <a:p>
@@ -4372,13 +5026,16 @@
             </a:pPr>
             <a:r>
               <a:rPr lang="en-AU" dirty="0" smtClean="0"/>
-              <a:t>Ethical </a:t>
+              <a:t>Projects-Page: </a:t>
+            </a:r>
+            <a:r>
+              <a:rPr lang="en-AU" dirty="0"/>
+              <a:t>I will add more projects I completed during my career</a:t>
             </a:r>
             <a:r>
               <a:rPr lang="en-AU" dirty="0" smtClean="0"/>
-              <a:t>issues: not as I am aware off.</a:t>
-            </a:r>
-            <a:endParaRPr lang="en-AU" dirty="0" smtClean="0"/>
+              <a:t>.</a:t>
+            </a:r>
           </a:p>
           <a:p>
             <a:pPr marL="457200" indent="-457200" algn="l">
@@ -4387,16 +5044,109 @@
             </a:pPr>
             <a:r>
               <a:rPr lang="en-AU" dirty="0" smtClean="0"/>
-              <a:t>Favourite </a:t>
-            </a:r>
+              <a:t>Landing –Page: I used the Matterhorn as a background. The additional grey gradient makes the sky even look bluer.</a:t>
+            </a:r>
+            <a:endParaRPr lang="en-AU" dirty="0"/>
+          </a:p>
+          <a:p>
+            <a:pPr marL="457200" indent="-457200" algn="l">
+              <a:buFont typeface="Arial" panose="020B0604020202020204" pitchFamily="34" charset="0"/>
+              <a:buChar char="•"/>
+            </a:pPr>
             <a:r>
               <a:rPr lang="en-AU" dirty="0" smtClean="0"/>
-              <a:t>parts: designing the graphic elements</a:t>
-            </a:r>
+              <a:t>Blog-Page: </a:t>
+            </a:r>
+            <a:r>
+              <a:rPr lang="en-AU" dirty="0"/>
+              <a:t>I used a table to organised text and pictures. I am looking forward to learn how to make this more interactive, so viewers can leave a comment and start a discussion</a:t>
+            </a:r>
+            <a:r>
+              <a:rPr lang="en-AU" dirty="0" smtClean="0"/>
+              <a:t>.</a:t>
+            </a:r>
+            <a:endParaRPr lang="en-AU" dirty="0" smtClean="0"/>
+          </a:p>
+          <a:p>
+            <a:pPr marL="457200" indent="-457200" algn="l">
+              <a:buFont typeface="Arial" panose="020B0604020202020204" pitchFamily="34" charset="0"/>
+              <a:buChar char="•"/>
+            </a:pPr>
+            <a:r>
+              <a:rPr lang="en-AU" dirty="0" smtClean="0"/>
+              <a:t>Challenges</a:t>
+            </a:r>
+            <a:r>
+              <a:rPr lang="en-AU" dirty="0" smtClean="0"/>
+              <a:t>: making the flex box work for the small devices. </a:t>
+            </a:r>
+          </a:p>
+          <a:p>
+            <a:pPr marL="457200" indent="-457200" algn="l">
+              <a:buFont typeface="Arial" panose="020B0604020202020204" pitchFamily="34" charset="0"/>
+              <a:buChar char="•"/>
+            </a:pPr>
+            <a:r>
+              <a:rPr lang="en-AU" dirty="0" smtClean="0"/>
+              <a:t>Ethical issues: not as I am aware off.</a:t>
+            </a:r>
+          </a:p>
+          <a:p>
+            <a:pPr marL="457200" indent="-457200" algn="l">
+              <a:buFont typeface="Arial" panose="020B0604020202020204" pitchFamily="34" charset="0"/>
+              <a:buChar char="•"/>
+            </a:pPr>
+            <a:r>
+              <a:rPr lang="en-AU" dirty="0" smtClean="0"/>
+              <a:t>Favourite parts: designing the graphic </a:t>
+            </a:r>
+            <a:r>
+              <a:rPr lang="en-AU" dirty="0" smtClean="0"/>
+              <a:t>elements, bringing the design to live</a:t>
+            </a:r>
+          </a:p>
+          <a:p>
+            <a:pPr marL="457200" indent="-457200" algn="l">
+              <a:buFont typeface="Arial" panose="020B0604020202020204" pitchFamily="34" charset="0"/>
+              <a:buChar char="•"/>
+            </a:pPr>
             <a:endParaRPr lang="en-AU" dirty="0"/>
           </a:p>
         </p:txBody>
       </p:sp>
+      <p:pic>
+        <p:nvPicPr>
+          <p:cNvPr id="7" name="Audio 6">
+            <a:hlinkClick r:id="" action="ppaction://media"/>
+          </p:cNvPr>
+          <p:cNvPicPr>
+            <a:picLocks noChangeAspect="1"/>
+          </p:cNvPicPr>
+          <p:nvPr>
+            <a:audioFile r:link="rId2"/>
+            <p:extLst>
+              <p:ext uri="{DAA4B4D4-6D71-4841-9C94-3DE7FCFB9230}">
+                <p14:media xmlns:p14="http://schemas.microsoft.com/office/powerpoint/2010/main" r:embed="rId1"/>
+              </p:ext>
+            </p:extLst>
+          </p:nvPr>
+        </p:nvPicPr>
+        <p:blipFill>
+          <a:blip r:embed="rId4"/>
+          <a:stretch>
+            <a:fillRect/>
+          </a:stretch>
+        </p:blipFill>
+        <p:spPr>
+          <a:xfrm>
+            <a:off x="8440738" y="6154738"/>
+            <a:ext cx="487362" cy="487362"/>
+          </a:xfrm>
+          <a:prstGeom prst="rect">
+            <a:avLst/>
+          </a:prstGeom>
+        </p:spPr>
+      </p:pic>
     </p:spTree>
     <p:extLst>
       <p:ext uri="{BB962C8B-B14F-4D97-AF65-F5344CB8AC3E}">
@@ -4407,6 +5157,101 @@
   <p:clrMapOvr>
     <a:masterClrMapping/>
   </p:clrMapOvr>
+  <mc:AlternateContent xmlns:mc="http://schemas.openxmlformats.org/markup-compatibility/2006">
+    <mc:Choice xmlns:p14="http://schemas.microsoft.com/office/powerpoint/2010/main" Requires="p14">
+      <p:transition spd="slow" p14:dur="2000" advTm="624"/>
+    </mc:Choice>
+    <mc:Fallback>
+      <p:transition spd="slow" advTm="624"/>
+    </mc:Fallback>
+  </mc:AlternateContent>
+  <p:timing>
+    <p:tnLst>
+      <p:par>
+        <p:cTn id="1" dur="indefinite" restart="never" nodeType="tmRoot">
+          <p:childTnLst>
+            <p:seq concurrent="1" nextAc="seek">
+              <p:cTn id="2" dur="indefinite" nodeType="mainSeq">
+                <p:childTnLst>
+                  <p:par>
+                    <p:cTn id="3" fill="hold">
+                      <p:stCondLst>
+                        <p:cond delay="indefinite"/>
+                        <p:cond evt="onBegin" delay="0">
+                          <p:tn val="2"/>
+                        </p:cond>
+                      </p:stCondLst>
+                      <p:childTnLst>
+                        <p:par>
+                          <p:cTn id="4" fill="hold">
+                            <p:stCondLst>
+                              <p:cond delay="0"/>
+                            </p:stCondLst>
+                            <p:childTnLst>
+                              <p:par>
+                                <p:cTn id="5" presetID="1" presetClass="mediacall" presetSubtype="0" fill="hold" nodeType="afterEffect">
+                                  <p:stCondLst>
+                                    <p:cond delay="0"/>
+                                  </p:stCondLst>
+                                  <p:childTnLst>
+                                    <p:cmd type="call" cmd="playFrom(0.0)">
+                                      <p:cBhvr>
+                                        <p:cTn id="6" dur="1" fill="hold"/>
+                                        <p:tgtEl>
+                                          <p:spTgt spid="7"/>
+                                        </p:tgtEl>
+                                      </p:cBhvr>
+                                    </p:cmd>
+                                  </p:childTnLst>
+                                </p:cTn>
+                              </p:par>
+                            </p:childTnLst>
+                          </p:cTn>
+                        </p:par>
+                      </p:childTnLst>
+                    </p:cTn>
+                  </p:par>
+                </p:childTnLst>
+              </p:cTn>
+              <p:prevCondLst>
+                <p:cond evt="onPrev" delay="0">
+                  <p:tgtEl>
+                    <p:sldTgt/>
+                  </p:tgtEl>
+                </p:cond>
+              </p:prevCondLst>
+              <p:nextCondLst>
+                <p:cond evt="onNext" delay="0">
+                  <p:tgtEl>
+                    <p:sldTgt/>
+                  </p:tgtEl>
+                </p:cond>
+              </p:nextCondLst>
+            </p:seq>
+            <p:audio isNarration="1">
+              <p:cMediaNode vol="80000" showWhenStopped="0">
+                <p:cTn id="7" fill="hold" display="0">
+                  <p:stCondLst>
+                    <p:cond delay="indefinite"/>
+                  </p:stCondLst>
+                  <p:endCondLst>
+                    <p:cond evt="onStopAudio" delay="0">
+                      <p:tgtEl>
+                        <p:sldTgt/>
+                      </p:tgtEl>
+                    </p:cond>
+                  </p:endCondLst>
+                </p:cTn>
+                <p:tgtEl>
+                  <p:spTgt spid="7"/>
+                </p:tgtEl>
+              </p:cMediaNode>
+            </p:audio>
+          </p:childTnLst>
+        </p:cTn>
+      </p:par>
+    </p:tnLst>
+  </p:timing>
 </p:sld>
 </file>
 

</xml_diff>

<commit_message>
updated screenshots and slide deck
</commit_message>
<xml_diff>
--- a/ppt/Slide Deck.pptx
+++ b/ppt/Slide Deck.pptx
@@ -197,7 +197,7 @@
           <a:p>
             <a:fld id="{3E860FF5-3020-4B9C-ABD5-65ABBC874B95}" type="datetimeFigureOut">
               <a:rPr lang="en-AU" smtClean="0"/>
-              <a:t>9/11/2022</a:t>
+              <a:t>11/11/2022</a:t>
             </a:fld>
             <a:endParaRPr lang="en-AU"/>
           </a:p>
@@ -998,7 +998,7 @@
           <a:p>
             <a:fld id="{30C82057-5E07-49DC-A834-E014E79DC199}" type="datetimeFigureOut">
               <a:rPr lang="en-AU" smtClean="0"/>
-              <a:t>9/11/2022</a:t>
+              <a:t>11/11/2022</a:t>
             </a:fld>
             <a:endParaRPr lang="en-AU"/>
           </a:p>
@@ -1168,7 +1168,7 @@
           <a:p>
             <a:fld id="{30C82057-5E07-49DC-A834-E014E79DC199}" type="datetimeFigureOut">
               <a:rPr lang="en-AU" smtClean="0"/>
-              <a:t>9/11/2022</a:t>
+              <a:t>11/11/2022</a:t>
             </a:fld>
             <a:endParaRPr lang="en-AU"/>
           </a:p>
@@ -1348,7 +1348,7 @@
           <a:p>
             <a:fld id="{30C82057-5E07-49DC-A834-E014E79DC199}" type="datetimeFigureOut">
               <a:rPr lang="en-AU" smtClean="0"/>
-              <a:t>9/11/2022</a:t>
+              <a:t>11/11/2022</a:t>
             </a:fld>
             <a:endParaRPr lang="en-AU"/>
           </a:p>
@@ -1518,7 +1518,7 @@
           <a:p>
             <a:fld id="{30C82057-5E07-49DC-A834-E014E79DC199}" type="datetimeFigureOut">
               <a:rPr lang="en-AU" smtClean="0"/>
-              <a:t>9/11/2022</a:t>
+              <a:t>11/11/2022</a:t>
             </a:fld>
             <a:endParaRPr lang="en-AU"/>
           </a:p>
@@ -1764,7 +1764,7 @@
           <a:p>
             <a:fld id="{30C82057-5E07-49DC-A834-E014E79DC199}" type="datetimeFigureOut">
               <a:rPr lang="en-AU" smtClean="0"/>
-              <a:t>9/11/2022</a:t>
+              <a:t>11/11/2022</a:t>
             </a:fld>
             <a:endParaRPr lang="en-AU"/>
           </a:p>
@@ -2052,7 +2052,7 @@
           <a:p>
             <a:fld id="{30C82057-5E07-49DC-A834-E014E79DC199}" type="datetimeFigureOut">
               <a:rPr lang="en-AU" smtClean="0"/>
-              <a:t>9/11/2022</a:t>
+              <a:t>11/11/2022</a:t>
             </a:fld>
             <a:endParaRPr lang="en-AU"/>
           </a:p>
@@ -2474,7 +2474,7 @@
           <a:p>
             <a:fld id="{30C82057-5E07-49DC-A834-E014E79DC199}" type="datetimeFigureOut">
               <a:rPr lang="en-AU" smtClean="0"/>
-              <a:t>9/11/2022</a:t>
+              <a:t>11/11/2022</a:t>
             </a:fld>
             <a:endParaRPr lang="en-AU"/>
           </a:p>
@@ -2592,7 +2592,7 @@
           <a:p>
             <a:fld id="{30C82057-5E07-49DC-A834-E014E79DC199}" type="datetimeFigureOut">
               <a:rPr lang="en-AU" smtClean="0"/>
-              <a:t>9/11/2022</a:t>
+              <a:t>11/11/2022</a:t>
             </a:fld>
             <a:endParaRPr lang="en-AU"/>
           </a:p>
@@ -2687,7 +2687,7 @@
           <a:p>
             <a:fld id="{30C82057-5E07-49DC-A834-E014E79DC199}" type="datetimeFigureOut">
               <a:rPr lang="en-AU" smtClean="0"/>
-              <a:t>9/11/2022</a:t>
+              <a:t>11/11/2022</a:t>
             </a:fld>
             <a:endParaRPr lang="en-AU"/>
           </a:p>
@@ -2964,7 +2964,7 @@
           <a:p>
             <a:fld id="{30C82057-5E07-49DC-A834-E014E79DC199}" type="datetimeFigureOut">
               <a:rPr lang="en-AU" smtClean="0"/>
-              <a:t>9/11/2022</a:t>
+              <a:t>11/11/2022</a:t>
             </a:fld>
             <a:endParaRPr lang="en-AU"/>
           </a:p>
@@ -3217,7 +3217,7 @@
           <a:p>
             <a:fld id="{30C82057-5E07-49DC-A834-E014E79DC199}" type="datetimeFigureOut">
               <a:rPr lang="en-AU" smtClean="0"/>
-              <a:t>9/11/2022</a:t>
+              <a:t>11/11/2022</a:t>
             </a:fld>
             <a:endParaRPr lang="en-AU"/>
           </a:p>
@@ -3430,7 +3430,7 @@
           <a:p>
             <a:fld id="{30C82057-5E07-49DC-A834-E014E79DC199}" type="datetimeFigureOut">
               <a:rPr lang="en-AU" smtClean="0"/>
-              <a:t>9/11/2022</a:t>
+              <a:t>11/11/2022</a:t>
             </a:fld>
             <a:endParaRPr lang="en-AU"/>
           </a:p>
@@ -3854,14 +3854,47 @@
       </p:sp>
       <p:pic>
         <p:nvPicPr>
-          <p:cNvPr id="5" name="Picture 4" descr="Screen Clipping"/>
+          <p:cNvPr id="8" name="Audio 7">
+            <a:hlinkClick r:id="" action="ppaction://media"/>
+          </p:cNvPr>
+          <p:cNvPicPr>
+            <a:picLocks noChangeAspect="1"/>
+          </p:cNvPicPr>
+          <p:nvPr>
+            <a:audioFile r:link="rId2"/>
+            <p:extLst>
+              <p:ext uri="{DAA4B4D4-6D71-4841-9C94-3DE7FCFB9230}">
+                <p14:media xmlns:p14="http://schemas.microsoft.com/office/powerpoint/2010/main" r:embed="rId1"/>
+              </p:ext>
+            </p:extLst>
+          </p:nvPr>
+        </p:nvPicPr>
+        <p:blipFill>
+          <a:blip r:embed="rId5"/>
+          <a:stretch>
+            <a:fillRect/>
+          </a:stretch>
+        </p:blipFill>
+        <p:spPr>
+          <a:xfrm>
+            <a:off x="8440738" y="6154738"/>
+            <a:ext cx="487362" cy="487362"/>
+          </a:xfrm>
+          <a:prstGeom prst="rect">
+            <a:avLst/>
+          </a:prstGeom>
+        </p:spPr>
+      </p:pic>
+      <p:pic>
+        <p:nvPicPr>
+          <p:cNvPr id="4" name="Picture 3" descr="Screen Clipping"/>
           <p:cNvPicPr>
             <a:picLocks noChangeAspect="1"/>
           </p:cNvPicPr>
           <p:nvPr/>
         </p:nvPicPr>
         <p:blipFill>
-          <a:blip r:embed="rId5">
+          <a:blip r:embed="rId6">
             <a:extLst>
               <a:ext uri="{28A0092B-C50C-407E-A947-70E740481C1C}">
                 <a14:useLocalDpi xmlns:a14="http://schemas.microsoft.com/office/drawing/2010/main" val="0"/>
@@ -3874,41 +3907,8 @@
         </p:blipFill>
         <p:spPr>
           <a:xfrm>
-            <a:off x="827584" y="1335315"/>
-            <a:ext cx="7387941" cy="4829990"/>
-          </a:xfrm>
-          <a:prstGeom prst="rect">
-            <a:avLst/>
-          </a:prstGeom>
-        </p:spPr>
-      </p:pic>
-      <p:pic>
-        <p:nvPicPr>
-          <p:cNvPr id="8" name="Audio 7">
-            <a:hlinkClick r:id="" action="ppaction://media"/>
-          </p:cNvPr>
-          <p:cNvPicPr>
-            <a:picLocks noChangeAspect="1"/>
-          </p:cNvPicPr>
-          <p:nvPr>
-            <a:audioFile r:link="rId2"/>
-            <p:extLst>
-              <p:ext uri="{DAA4B4D4-6D71-4841-9C94-3DE7FCFB9230}">
-                <p14:media xmlns:p14="http://schemas.microsoft.com/office/powerpoint/2010/main" r:embed="rId1"/>
-              </p:ext>
-            </p:extLst>
-          </p:nvPr>
-        </p:nvPicPr>
-        <p:blipFill>
-          <a:blip r:embed="rId6"/>
-          <a:stretch>
-            <a:fillRect/>
-          </a:stretch>
-        </p:blipFill>
-        <p:spPr>
-          <a:xfrm>
-            <a:off x="8440738" y="6154738"/>
-            <a:ext cx="487362" cy="487362"/>
+            <a:off x="1259632" y="1412776"/>
+            <a:ext cx="6574799" cy="5106963"/>
           </a:xfrm>
           <a:prstGeom prst="rect">
             <a:avLst/>
@@ -3925,11 +3925,11 @@
   <p:clrMapOvr>
     <a:masterClrMapping/>
   </p:clrMapOvr>
-  <mc:AlternateContent xmlns:mc="http://schemas.openxmlformats.org/markup-compatibility/2006">
-    <mc:Choice xmlns:p14="http://schemas.microsoft.com/office/powerpoint/2010/main" Requires="p14">
+  <mc:AlternateContent xmlns:mc="http://schemas.openxmlformats.org/markup-compatibility/2006" xmlns:p14="http://schemas.microsoft.com/office/powerpoint/2010/main">
+    <mc:Choice Requires="p14">
       <p:transition spd="slow" p14:dur="2000" advTm="2297"/>
     </mc:Choice>
-    <mc:Fallback>
+    <mc:Fallback xmlns="">
       <p:transition spd="slow" advTm="2297"/>
     </mc:Fallback>
   </mc:AlternateContent>
@@ -4160,11 +4160,11 @@
   <p:clrMapOvr>
     <a:masterClrMapping/>
   </p:clrMapOvr>
-  <mc:AlternateContent xmlns:mc="http://schemas.openxmlformats.org/markup-compatibility/2006">
-    <mc:Choice xmlns:p14="http://schemas.microsoft.com/office/powerpoint/2010/main" Requires="p14">
+  <mc:AlternateContent xmlns:mc="http://schemas.openxmlformats.org/markup-compatibility/2006" xmlns:p14="http://schemas.microsoft.com/office/powerpoint/2010/main">
+    <mc:Choice Requires="p14">
       <p:transition spd="slow" p14:dur="2000" advTm="2248"/>
     </mc:Choice>
-    <mc:Fallback>
+    <mc:Fallback xmlns="">
       <p:transition spd="slow" advTm="2248"/>
     </mc:Fallback>
   </mc:AlternateContent>
@@ -4395,11 +4395,11 @@
   <p:clrMapOvr>
     <a:masterClrMapping/>
   </p:clrMapOvr>
-  <mc:AlternateContent xmlns:mc="http://schemas.openxmlformats.org/markup-compatibility/2006">
-    <mc:Choice xmlns:p14="http://schemas.microsoft.com/office/powerpoint/2010/main" Requires="p14">
+  <mc:AlternateContent xmlns:mc="http://schemas.openxmlformats.org/markup-compatibility/2006" xmlns:p14="http://schemas.microsoft.com/office/powerpoint/2010/main">
+    <mc:Choice Requires="p14">
       <p:transition spd="slow" p14:dur="2000" advTm="1360"/>
     </mc:Choice>
-    <mc:Fallback>
+    <mc:Fallback xmlns="">
       <p:transition spd="slow" advTm="1360"/>
     </mc:Fallback>
   </mc:AlternateContent>
@@ -4630,11 +4630,11 @@
   <p:clrMapOvr>
     <a:masterClrMapping/>
   </p:clrMapOvr>
-  <mc:AlternateContent xmlns:mc="http://schemas.openxmlformats.org/markup-compatibility/2006">
-    <mc:Choice xmlns:p14="http://schemas.microsoft.com/office/powerpoint/2010/main" Requires="p14">
+  <mc:AlternateContent xmlns:mc="http://schemas.openxmlformats.org/markup-compatibility/2006" xmlns:p14="http://schemas.microsoft.com/office/powerpoint/2010/main">
+    <mc:Choice Requires="p14">
       <p:transition spd="slow" p14:dur="2000" advTm="1496"/>
     </mc:Choice>
-    <mc:Fallback>
+    <mc:Fallback xmlns="">
       <p:transition spd="slow" advTm="1496"/>
     </mc:Fallback>
   </mc:AlternateContent>
@@ -4785,21 +4785,13 @@
           <a:p>
             <a:r>
               <a:rPr lang="en-AU" dirty="0" smtClean="0"/>
-              <a:t>I Looked </a:t>
-            </a:r>
+              <a:t>I Looked at multiple web designs and got inspiration for coding. </a:t>
+            </a:r>
+          </a:p>
+          <a:p>
             <a:r>
               <a:rPr lang="en-AU" dirty="0" smtClean="0"/>
-              <a:t>at multiple web designs and got inspiration for coding. </a:t>
-            </a:r>
-          </a:p>
-          <a:p>
-            <a:r>
-              <a:rPr lang="en-AU" dirty="0" smtClean="0"/>
-              <a:t>I tried to get the best of all of </a:t>
-            </a:r>
-            <a:r>
-              <a:rPr lang="en-AU" dirty="0" smtClean="0"/>
-              <a:t>them.</a:t>
+              <a:t>I tried to get the best of all of them.</a:t>
             </a:r>
             <a:endParaRPr lang="en-AU" dirty="0"/>
           </a:p>
@@ -4848,11 +4840,11 @@
   <p:clrMapOvr>
     <a:masterClrMapping/>
   </p:clrMapOvr>
-  <mc:AlternateContent xmlns:mc="http://schemas.openxmlformats.org/markup-compatibility/2006">
-    <mc:Choice xmlns:p14="http://schemas.microsoft.com/office/powerpoint/2010/main" Requires="p14">
+  <mc:AlternateContent xmlns:mc="http://schemas.openxmlformats.org/markup-compatibility/2006" xmlns:p14="http://schemas.microsoft.com/office/powerpoint/2010/main">
+    <mc:Choice Requires="p14">
       <p:transition spd="slow" p14:dur="2000" advTm="925"/>
     </mc:Choice>
-    <mc:Fallback>
+    <mc:Fallback xmlns="">
       <p:transition spd="slow" advTm="925"/>
     </mc:Fallback>
   </mc:AlternateContent>
@@ -5009,7 +5001,7 @@
         </p:spPr>
         <p:txBody>
           <a:bodyPr>
-            <a:normAutofit fontScale="55000" lnSpcReduction="20000"/>
+            <a:normAutofit fontScale="47500" lnSpcReduction="20000"/>
           </a:bodyPr>
           <a:lstStyle/>
           <a:p>
@@ -5065,7 +5057,6 @@
               <a:rPr lang="en-AU" dirty="0" smtClean="0"/>
               <a:t>.</a:t>
             </a:r>
-            <a:endParaRPr lang="en-AU" dirty="0" smtClean="0"/>
           </a:p>
           <a:p>
             <a:pPr marL="457200" indent="-457200" algn="l">
@@ -5074,11 +5065,7 @@
             </a:pPr>
             <a:r>
               <a:rPr lang="en-AU" dirty="0" smtClean="0"/>
-              <a:t>Challenges</a:t>
-            </a:r>
-            <a:r>
-              <a:rPr lang="en-AU" dirty="0" smtClean="0"/>
-              <a:t>: making the flex box work for the small devices. </a:t>
+              <a:t>Challenges: making the flex box work for the small devices. </a:t>
             </a:r>
           </a:p>
           <a:p>
@@ -5088,8 +5075,17 @@
             </a:pPr>
             <a:r>
               <a:rPr lang="en-AU" dirty="0" smtClean="0"/>
-              <a:t>Ethical issues: not as I am aware off.</a:t>
-            </a:r>
+              <a:t>Ethical issues: </a:t>
+            </a:r>
+            <a:r>
+              <a:rPr lang="en-AU" dirty="0" smtClean="0"/>
+              <a:t>At the project page I explained processes and tools used by my previous employer</a:t>
+            </a:r>
+            <a:r>
+              <a:rPr lang="en-AU" dirty="0" smtClean="0"/>
+              <a:t>. I am not sure how far I can go there. </a:t>
+            </a:r>
+            <a:endParaRPr lang="en-AU" dirty="0" smtClean="0"/>
           </a:p>
           <a:p>
             <a:pPr marL="457200" indent="-457200" algn="l">
@@ -5098,12 +5094,39 @@
             </a:pPr>
             <a:r>
               <a:rPr lang="en-AU" dirty="0" smtClean="0"/>
-              <a:t>Favourite parts: designing the graphic </a:t>
+              <a:t>Favourite parts: designing the graphic elements, bringing the design to </a:t>
             </a:r>
             <a:r>
               <a:rPr lang="en-AU" dirty="0" smtClean="0"/>
-              <a:t>elements, bringing the design to live</a:t>
-            </a:r>
+              <a:t>live</a:t>
+            </a:r>
+          </a:p>
+          <a:p>
+            <a:pPr marL="457200" indent="-457200" algn="l">
+              <a:buFont typeface="Arial" panose="020B0604020202020204" pitchFamily="34" charset="0"/>
+              <a:buChar char="•"/>
+            </a:pPr>
+            <a:r>
+              <a:rPr lang="en-US" dirty="0" smtClean="0"/>
+              <a:t>I used a background picture in the landing page. I am </a:t>
+            </a:r>
+            <a:r>
+              <a:rPr lang="en-US" dirty="0" err="1" smtClean="0"/>
+              <a:t>courious</a:t>
+            </a:r>
+            <a:r>
+              <a:rPr lang="en-US" dirty="0" smtClean="0"/>
+              <a:t> </a:t>
+            </a:r>
+            <a:r>
+              <a:rPr lang="en-US" dirty="0" err="1" smtClean="0"/>
+              <a:t>iif</a:t>
+            </a:r>
+            <a:r>
+              <a:rPr lang="en-US" dirty="0" smtClean="0"/>
+              <a:t> I can use other media too like a background animation or sound.</a:t>
+            </a:r>
+            <a:endParaRPr lang="en-AU" dirty="0" smtClean="0"/>
           </a:p>
           <a:p>
             <a:pPr marL="457200" indent="-457200" algn="l">
@@ -5157,11 +5180,11 @@
   <p:clrMapOvr>
     <a:masterClrMapping/>
   </p:clrMapOvr>
-  <mc:AlternateContent xmlns:mc="http://schemas.openxmlformats.org/markup-compatibility/2006">
-    <mc:Choice xmlns:p14="http://schemas.microsoft.com/office/powerpoint/2010/main" Requires="p14">
+  <mc:AlternateContent xmlns:mc="http://schemas.openxmlformats.org/markup-compatibility/2006" xmlns:p14="http://schemas.microsoft.com/office/powerpoint/2010/main">
+    <mc:Choice Requires="p14">
       <p:transition spd="slow" p14:dur="2000" advTm="624"/>
     </mc:Choice>
-    <mc:Fallback>
+    <mc:Fallback xmlns="">
       <p:transition spd="slow" advTm="624"/>
     </mc:Fallback>
   </mc:AlternateContent>

</xml_diff>